<commit_message>
added final paper and cleanup
</commit_message>
<xml_diff>
--- a/Mix Match and Beyond! – Effectiveness of.pptx
+++ b/Mix Match and Beyond! – Effectiveness of.pptx
@@ -1,23 +1,25 @@
 
 <file path=ppt/presentation.xml><?xml version="1.0" encoding="utf-8"?>
-<p:presentation xmlns:a="http://schemas.openxmlformats.org/drawingml/2006/main" xmlns:r="http://schemas.openxmlformats.org/officeDocument/2006/relationships" xmlns:p="http://schemas.openxmlformats.org/presentationml/2006/main" saveSubsetFonts="1">
+<p:presentation xmlns:a="http://schemas.openxmlformats.org/drawingml/2006/main" xmlns:r="http://schemas.openxmlformats.org/officeDocument/2006/relationships" xmlns:p="http://schemas.openxmlformats.org/presentationml/2006/main" showSpecialPlsOnTitleSld="0" saveSubsetFonts="1">
   <p:sldMasterIdLst>
     <p:sldMasterId id="2147483648" r:id="rId1"/>
   </p:sldMasterIdLst>
   <p:notesMasterIdLst>
-    <p:notesMasterId r:id="rId12"/>
+    <p:notesMasterId r:id="rId14"/>
   </p:notesMasterIdLst>
   <p:sldIdLst>
     <p:sldId id="256" r:id="rId2"/>
     <p:sldId id="259" r:id="rId3"/>
     <p:sldId id="257" r:id="rId4"/>
     <p:sldId id="261" r:id="rId5"/>
-    <p:sldId id="258" r:id="rId6"/>
-    <p:sldId id="260" r:id="rId7"/>
-    <p:sldId id="262" r:id="rId8"/>
-    <p:sldId id="263" r:id="rId9"/>
-    <p:sldId id="264" r:id="rId10"/>
-    <p:sldId id="265" r:id="rId11"/>
+    <p:sldId id="267" r:id="rId6"/>
+    <p:sldId id="258" r:id="rId7"/>
+    <p:sldId id="260" r:id="rId8"/>
+    <p:sldId id="262" r:id="rId9"/>
+    <p:sldId id="263" r:id="rId10"/>
+    <p:sldId id="264" r:id="rId11"/>
+    <p:sldId id="266" r:id="rId12"/>
+    <p:sldId id="265" r:id="rId13"/>
   </p:sldIdLst>
   <p:sldSz cx="12192000" cy="6858000"/>
   <p:notesSz cx="6858000" cy="9144000"/>
@@ -116,7 +118,179 @@
       </a:defRPr>
     </a:lvl9pPr>
   </p:defaultTextStyle>
+  <p:extLst>
+    <p:ext uri="{EFAFB233-063F-42B5-8137-9DF3F51BA10A}">
+      <p15:sldGuideLst xmlns:p15="http://schemas.microsoft.com/office/powerpoint/2012/main"/>
+    </p:ext>
+  </p:extLst>
 </p:presentation>
+</file>
+
+<file path=ppt/revisionInfo.xml><?xml version="1.0" encoding="utf-8"?>
+<p1510:revInfo xmlns:a="http://schemas.openxmlformats.org/drawingml/2006/main" xmlns:r="http://schemas.openxmlformats.org/officeDocument/2006/relationships" xmlns:p1510="http://schemas.microsoft.com/office/powerpoint/2015/10/main">
+  <p1510:revLst>
+    <p1510:client id="{2FC37C5C-9C93-450C-B79F-4E4ABB2984F1}" v="12" dt="2024-04-21T17:01:50.202"/>
+  </p1510:revLst>
+</p1510:revInfo>
+</file>
+
+<file path=ppt/changesInfos/changesInfo1.xml><?xml version="1.0" encoding="utf-8"?>
+<pc:chgInfo xmlns:a="http://schemas.openxmlformats.org/drawingml/2006/main" xmlns:r="http://schemas.openxmlformats.org/officeDocument/2006/relationships" xmlns:ac="http://schemas.microsoft.com/office/drawing/2013/main/command" xmlns:pc="http://schemas.microsoft.com/office/powerpoint/2013/main/command">
+  <pc:docChgLst>
+    <pc:chgData name="Abbaas Alif M N" userId="c587467ad08beec6" providerId="LiveId" clId="{2FC37C5C-9C93-450C-B79F-4E4ABB2984F1}"/>
+    <pc:docChg chg="undo custSel addSld delSld modSld">
+      <pc:chgData name="Abbaas Alif M N" userId="c587467ad08beec6" providerId="LiveId" clId="{2FC37C5C-9C93-450C-B79F-4E4ABB2984F1}" dt="2024-04-21T17:02:13.794" v="162" actId="732"/>
+      <pc:docMkLst>
+        <pc:docMk/>
+      </pc:docMkLst>
+      <pc:sldChg chg="addSp modSp mod">
+        <pc:chgData name="Abbaas Alif M N" userId="c587467ad08beec6" providerId="LiveId" clId="{2FC37C5C-9C93-450C-B79F-4E4ABB2984F1}" dt="2024-04-16T18:16:14.684" v="98" actId="122"/>
+        <pc:sldMkLst>
+          <pc:docMk/>
+          <pc:sldMk cId="617031598" sldId="256"/>
+        </pc:sldMkLst>
+        <pc:spChg chg="mod">
+          <ac:chgData name="Abbaas Alif M N" userId="c587467ad08beec6" providerId="LiveId" clId="{2FC37C5C-9C93-450C-B79F-4E4ABB2984F1}" dt="2024-04-16T18:16:14.684" v="98" actId="122"/>
+          <ac:spMkLst>
+            <pc:docMk/>
+            <pc:sldMk cId="617031598" sldId="256"/>
+            <ac:spMk id="2" creationId="{353EED75-32B1-071F-3E86-55E144C897D7}"/>
+          </ac:spMkLst>
+        </pc:spChg>
+        <pc:spChg chg="mod">
+          <ac:chgData name="Abbaas Alif M N" userId="c587467ad08beec6" providerId="LiveId" clId="{2FC37C5C-9C93-450C-B79F-4E4ABB2984F1}" dt="2024-04-16T18:16:02.956" v="96" actId="1076"/>
+          <ac:spMkLst>
+            <pc:docMk/>
+            <pc:sldMk cId="617031598" sldId="256"/>
+            <ac:spMk id="3" creationId="{21B2D9D9-933C-AE16-A54A-FEDA9A035E29}"/>
+          </ac:spMkLst>
+        </pc:spChg>
+        <pc:picChg chg="add mod">
+          <ac:chgData name="Abbaas Alif M N" userId="c587467ad08beec6" providerId="LiveId" clId="{2FC37C5C-9C93-450C-B79F-4E4ABB2984F1}" dt="2024-04-16T18:14:51.883" v="83" actId="1076"/>
+          <ac:picMkLst>
+            <pc:docMk/>
+            <pc:sldMk cId="617031598" sldId="256"/>
+            <ac:picMk id="1026" creationId="{6C7FC437-FF64-D408-9CD7-60DCA3D0A996}"/>
+          </ac:picMkLst>
+        </pc:picChg>
+      </pc:sldChg>
+      <pc:sldChg chg="add del">
+        <pc:chgData name="Abbaas Alif M N" userId="c587467ad08beec6" providerId="LiveId" clId="{2FC37C5C-9C93-450C-B79F-4E4ABB2984F1}" dt="2024-04-21T16:54:29.601" v="153" actId="47"/>
+        <pc:sldMkLst>
+          <pc:docMk/>
+          <pc:sldMk cId="996740435" sldId="257"/>
+        </pc:sldMkLst>
+      </pc:sldChg>
+      <pc:sldChg chg="add del">
+        <pc:chgData name="Abbaas Alif M N" userId="c587467ad08beec6" providerId="LiveId" clId="{2FC37C5C-9C93-450C-B79F-4E4ABB2984F1}" dt="2024-04-21T16:54:23.091" v="151" actId="47"/>
+        <pc:sldMkLst>
+          <pc:docMk/>
+          <pc:sldMk cId="1207198314" sldId="258"/>
+        </pc:sldMkLst>
+      </pc:sldChg>
+      <pc:sldChg chg="add del">
+        <pc:chgData name="Abbaas Alif M N" userId="c587467ad08beec6" providerId="LiveId" clId="{2FC37C5C-9C93-450C-B79F-4E4ABB2984F1}" dt="2024-04-21T16:54:28.669" v="152" actId="47"/>
+        <pc:sldMkLst>
+          <pc:docMk/>
+          <pc:sldMk cId="1396372649" sldId="261"/>
+        </pc:sldMkLst>
+      </pc:sldChg>
+      <pc:sldChg chg="modSp mod">
+        <pc:chgData name="Abbaas Alif M N" userId="c587467ad08beec6" providerId="LiveId" clId="{2FC37C5C-9C93-450C-B79F-4E4ABB2984F1}" dt="2024-04-16T18:12:08.723" v="3" actId="207"/>
+        <pc:sldMkLst>
+          <pc:docMk/>
+          <pc:sldMk cId="3510635656" sldId="264"/>
+        </pc:sldMkLst>
+        <pc:spChg chg="mod">
+          <ac:chgData name="Abbaas Alif M N" userId="c587467ad08beec6" providerId="LiveId" clId="{2FC37C5C-9C93-450C-B79F-4E4ABB2984F1}" dt="2024-04-16T18:11:24.399" v="0" actId="207"/>
+          <ac:spMkLst>
+            <pc:docMk/>
+            <pc:sldMk cId="3510635656" sldId="264"/>
+            <ac:spMk id="3" creationId="{2A80AB20-D356-2EA4-6986-1B7DB9171114}"/>
+          </ac:spMkLst>
+        </pc:spChg>
+        <pc:spChg chg="mod">
+          <ac:chgData name="Abbaas Alif M N" userId="c587467ad08beec6" providerId="LiveId" clId="{2FC37C5C-9C93-450C-B79F-4E4ABB2984F1}" dt="2024-04-16T18:11:51.010" v="2" actId="207"/>
+          <ac:spMkLst>
+            <pc:docMk/>
+            <pc:sldMk cId="3510635656" sldId="264"/>
+            <ac:spMk id="4" creationId="{39C19363-CC04-7270-DF3A-79E20065A321}"/>
+          </ac:spMkLst>
+        </pc:spChg>
+        <pc:spChg chg="mod">
+          <ac:chgData name="Abbaas Alif M N" userId="c587467ad08beec6" providerId="LiveId" clId="{2FC37C5C-9C93-450C-B79F-4E4ABB2984F1}" dt="2024-04-16T18:12:08.723" v="3" actId="207"/>
+          <ac:spMkLst>
+            <pc:docMk/>
+            <pc:sldMk cId="3510635656" sldId="264"/>
+            <ac:spMk id="5" creationId="{239076BC-4248-9E76-AB98-543DD05145C8}"/>
+          </ac:spMkLst>
+        </pc:spChg>
+      </pc:sldChg>
+      <pc:sldChg chg="addSp modSp new mod modAnim">
+        <pc:chgData name="Abbaas Alif M N" userId="c587467ad08beec6" providerId="LiveId" clId="{2FC37C5C-9C93-450C-B79F-4E4ABB2984F1}" dt="2024-04-16T18:56:30.197" v="147"/>
+        <pc:sldMkLst>
+          <pc:docMk/>
+          <pc:sldMk cId="1058058098" sldId="266"/>
+        </pc:sldMkLst>
+        <pc:spChg chg="mod">
+          <ac:chgData name="Abbaas Alif M N" userId="c587467ad08beec6" providerId="LiveId" clId="{2FC37C5C-9C93-450C-B79F-4E4ABB2984F1}" dt="2024-04-16T18:54:51.970" v="107" actId="14100"/>
+          <ac:spMkLst>
+            <pc:docMk/>
+            <pc:sldMk cId="1058058098" sldId="266"/>
+            <ac:spMk id="2" creationId="{37DA4A1A-6514-E4EE-6816-B415BBEF067A}"/>
+          </ac:spMkLst>
+        </pc:spChg>
+        <pc:spChg chg="add mod">
+          <ac:chgData name="Abbaas Alif M N" userId="c587467ad08beec6" providerId="LiveId" clId="{2FC37C5C-9C93-450C-B79F-4E4ABB2984F1}" dt="2024-04-16T18:55:13.277" v="111" actId="208"/>
+          <ac:spMkLst>
+            <pc:docMk/>
+            <pc:sldMk cId="1058058098" sldId="266"/>
+            <ac:spMk id="6" creationId="{7DEC69E2-51F3-FC55-DEB0-89D5789F0090}"/>
+          </ac:spMkLst>
+        </pc:spChg>
+        <pc:spChg chg="add mod">
+          <ac:chgData name="Abbaas Alif M N" userId="c587467ad08beec6" providerId="LiveId" clId="{2FC37C5C-9C93-450C-B79F-4E4ABB2984F1}" dt="2024-04-16T18:56:26.022" v="146" actId="1076"/>
+          <ac:spMkLst>
+            <pc:docMk/>
+            <pc:sldMk cId="1058058098" sldId="266"/>
+            <ac:spMk id="7" creationId="{3576F26B-B2CE-1432-0059-34B0150EE1C3}"/>
+          </ac:spMkLst>
+        </pc:spChg>
+        <pc:picChg chg="add">
+          <ac:chgData name="Abbaas Alif M N" userId="c587467ad08beec6" providerId="LiveId" clId="{2FC37C5C-9C93-450C-B79F-4E4ABB2984F1}" dt="2024-04-16T18:54:54.054" v="108" actId="22"/>
+          <ac:picMkLst>
+            <pc:docMk/>
+            <pc:sldMk cId="1058058098" sldId="266"/>
+            <ac:picMk id="5" creationId="{4F8667E7-B866-E58A-16C5-9F242E22C9D6}"/>
+          </ac:picMkLst>
+        </pc:picChg>
+      </pc:sldChg>
+      <pc:sldChg chg="addSp delSp modSp new mod">
+        <pc:chgData name="Abbaas Alif M N" userId="c587467ad08beec6" providerId="LiveId" clId="{2FC37C5C-9C93-450C-B79F-4E4ABB2984F1}" dt="2024-04-21T17:02:13.794" v="162" actId="732"/>
+        <pc:sldMkLst>
+          <pc:docMk/>
+          <pc:sldMk cId="2827068955" sldId="267"/>
+        </pc:sldMkLst>
+        <pc:spChg chg="add del">
+          <ac:chgData name="Abbaas Alif M N" userId="c587467ad08beec6" providerId="LiveId" clId="{2FC37C5C-9C93-450C-B79F-4E4ABB2984F1}" dt="2024-04-21T17:01:46.011" v="156" actId="22"/>
+          <ac:spMkLst>
+            <pc:docMk/>
+            <pc:sldMk cId="2827068955" sldId="267"/>
+            <ac:spMk id="4" creationId="{E446D205-6491-B38C-92F4-8AFFA09D4B49}"/>
+          </ac:spMkLst>
+        </pc:spChg>
+        <pc:picChg chg="add mod modCrop">
+          <ac:chgData name="Abbaas Alif M N" userId="c587467ad08beec6" providerId="LiveId" clId="{2FC37C5C-9C93-450C-B79F-4E4ABB2984F1}" dt="2024-04-21T17:02:13.794" v="162" actId="732"/>
+          <ac:picMkLst>
+            <pc:docMk/>
+            <pc:sldMk cId="2827068955" sldId="267"/>
+            <ac:picMk id="5" creationId="{F5FC1F42-E476-45AD-55C2-386120899030}"/>
+          </ac:picMkLst>
+        </pc:picChg>
+      </pc:sldChg>
+    </pc:docChg>
+  </pc:docChgLst>
+</pc:chgInfo>
 </file>
 
 <file path=ppt/notesMasters/notesMaster1.xml><?xml version="1.0" encoding="utf-8"?>
@@ -201,7 +375,7 @@
           <a:p>
             <a:fld id="{01CA711E-C41C-4585-9EDE-A1107BA05FFA}" type="datetimeFigureOut">
               <a:rPr lang="en-US" smtClean="0"/>
-              <a:t>4/15/2024</a:t>
+              <a:t>4/21/2024</a:t>
             </a:fld>
             <a:endParaRPr lang="en-US"/>
           </a:p>
@@ -745,7 +919,7 @@
           <a:p>
             <a:fld id="{1DC1B20C-20D6-494C-8543-C1E8F0AF9AD1}" type="slidenum">
               <a:rPr lang="en-US" smtClean="0"/>
-              <a:t>6</a:t>
+              <a:t>7</a:t>
             </a:fld>
             <a:endParaRPr lang="en-US"/>
           </a:p>
@@ -909,9 +1083,9 @@
           <a:bodyPr/>
           <a:lstStyle/>
           <a:p>
-            <a:fld id="{053AEB9F-7552-46C0-9089-1026F42020EE}" type="datetimeFigureOut">
+            <a:fld id="{4FBF4787-7A19-4287-A1E3-65A9120B6948}" type="datetime1">
               <a:rPr lang="en-US" smtClean="0"/>
-              <a:t>4/15/2024</a:t>
+              <a:t>4/21/2024</a:t>
             </a:fld>
             <a:endParaRPr lang="en-US"/>
           </a:p>
@@ -1107,9 +1281,9 @@
           <a:bodyPr/>
           <a:lstStyle/>
           <a:p>
-            <a:fld id="{053AEB9F-7552-46C0-9089-1026F42020EE}" type="datetimeFigureOut">
+            <a:fld id="{2C669048-2264-4430-B690-37977BF14435}" type="datetime1">
               <a:rPr lang="en-US" smtClean="0"/>
-              <a:t>4/15/2024</a:t>
+              <a:t>4/21/2024</a:t>
             </a:fld>
             <a:endParaRPr lang="en-US"/>
           </a:p>
@@ -1315,9 +1489,9 @@
           <a:bodyPr/>
           <a:lstStyle/>
           <a:p>
-            <a:fld id="{053AEB9F-7552-46C0-9089-1026F42020EE}" type="datetimeFigureOut">
+            <a:fld id="{DDA995B5-5D06-450F-97F2-3037AC11849E}" type="datetime1">
               <a:rPr lang="en-US" smtClean="0"/>
-              <a:t>4/15/2024</a:t>
+              <a:t>4/21/2024</a:t>
             </a:fld>
             <a:endParaRPr lang="en-US"/>
           </a:p>
@@ -1513,9 +1687,9 @@
           <a:bodyPr/>
           <a:lstStyle/>
           <a:p>
-            <a:fld id="{053AEB9F-7552-46C0-9089-1026F42020EE}" type="datetimeFigureOut">
+            <a:fld id="{84CE7DFA-4E17-4475-A5D7-A1F580A9B0A6}" type="datetime1">
               <a:rPr lang="en-US" smtClean="0"/>
-              <a:t>4/15/2024</a:t>
+              <a:t>4/21/2024</a:t>
             </a:fld>
             <a:endParaRPr lang="en-US"/>
           </a:p>
@@ -1788,9 +1962,9 @@
           <a:bodyPr/>
           <a:lstStyle/>
           <a:p>
-            <a:fld id="{053AEB9F-7552-46C0-9089-1026F42020EE}" type="datetimeFigureOut">
+            <a:fld id="{D88E119F-5D91-4AA1-84BC-E4216F9E6A09}" type="datetime1">
               <a:rPr lang="en-US" smtClean="0"/>
-              <a:t>4/15/2024</a:t>
+              <a:t>4/21/2024</a:t>
             </a:fld>
             <a:endParaRPr lang="en-US"/>
           </a:p>
@@ -2053,9 +2227,9 @@
           <a:bodyPr/>
           <a:lstStyle/>
           <a:p>
-            <a:fld id="{053AEB9F-7552-46C0-9089-1026F42020EE}" type="datetimeFigureOut">
+            <a:fld id="{7490A595-2094-4360-B3B4-D2274BE7BEBB}" type="datetime1">
               <a:rPr lang="en-US" smtClean="0"/>
-              <a:t>4/15/2024</a:t>
+              <a:t>4/21/2024</a:t>
             </a:fld>
             <a:endParaRPr lang="en-US"/>
           </a:p>
@@ -2465,9 +2639,9 @@
           <a:bodyPr/>
           <a:lstStyle/>
           <a:p>
-            <a:fld id="{053AEB9F-7552-46C0-9089-1026F42020EE}" type="datetimeFigureOut">
+            <a:fld id="{E0957F57-5316-4E3E-8F24-FE133AFC95DB}" type="datetime1">
               <a:rPr lang="en-US" smtClean="0"/>
-              <a:t>4/15/2024</a:t>
+              <a:t>4/21/2024</a:t>
             </a:fld>
             <a:endParaRPr lang="en-US"/>
           </a:p>
@@ -2606,9 +2780,9 @@
           <a:bodyPr/>
           <a:lstStyle/>
           <a:p>
-            <a:fld id="{053AEB9F-7552-46C0-9089-1026F42020EE}" type="datetimeFigureOut">
+            <a:fld id="{70F012AB-9454-4AA9-B2D6-78EF9C45942A}" type="datetime1">
               <a:rPr lang="en-US" smtClean="0"/>
-              <a:t>4/15/2024</a:t>
+              <a:t>4/21/2024</a:t>
             </a:fld>
             <a:endParaRPr lang="en-US"/>
           </a:p>
@@ -2719,9 +2893,9 @@
           <a:bodyPr/>
           <a:lstStyle/>
           <a:p>
-            <a:fld id="{053AEB9F-7552-46C0-9089-1026F42020EE}" type="datetimeFigureOut">
+            <a:fld id="{E98B2B54-6FF9-483A-B1BB-9D3B5F1ABEDC}" type="datetime1">
               <a:rPr lang="en-US" smtClean="0"/>
-              <a:t>4/15/2024</a:t>
+              <a:t>4/21/2024</a:t>
             </a:fld>
             <a:endParaRPr lang="en-US"/>
           </a:p>
@@ -3030,9 +3204,9 @@
           <a:bodyPr/>
           <a:lstStyle/>
           <a:p>
-            <a:fld id="{053AEB9F-7552-46C0-9089-1026F42020EE}" type="datetimeFigureOut">
+            <a:fld id="{A47BCDE6-7AC2-4472-B8F2-F299F34DD97C}" type="datetime1">
               <a:rPr lang="en-US" smtClean="0"/>
-              <a:t>4/15/2024</a:t>
+              <a:t>4/21/2024</a:t>
             </a:fld>
             <a:endParaRPr lang="en-US"/>
           </a:p>
@@ -3318,9 +3492,9 @@
           <a:bodyPr/>
           <a:lstStyle/>
           <a:p>
-            <a:fld id="{053AEB9F-7552-46C0-9089-1026F42020EE}" type="datetimeFigureOut">
+            <a:fld id="{7FC61167-1AE2-40EA-87F7-2FC7C77AF8FB}" type="datetime1">
               <a:rPr lang="en-US" smtClean="0"/>
-              <a:t>4/15/2024</a:t>
+              <a:t>4/21/2024</a:t>
             </a:fld>
             <a:endParaRPr lang="en-US"/>
           </a:p>
@@ -3559,9 +3733,9 @@
             </a:lvl1pPr>
           </a:lstStyle>
           <a:p>
-            <a:fld id="{053AEB9F-7552-46C0-9089-1026F42020EE}" type="datetimeFigureOut">
+            <a:fld id="{3E543DD7-7928-41A6-9F1B-8B2767AC1A6C}" type="datetime1">
               <a:rPr lang="en-US" smtClean="0"/>
-              <a:t>4/15/2024</a:t>
+              <a:t>4/21/2024</a:t>
             </a:fld>
             <a:endParaRPr lang="en-US"/>
           </a:p>
@@ -3678,6 +3852,7 @@
     <p:sldLayoutId id="2147483658" r:id="rId10"/>
     <p:sldLayoutId id="2147483659" r:id="rId11"/>
   </p:sldLayoutIdLst>
+  <p:hf hdr="0" ftr="0" dt="0"/>
   <p:txStyles>
     <p:titleStyle>
       <a:lvl1pPr algn="l" defTabSz="914400" rtl="0" eaLnBrk="1" latinLnBrk="0" hangingPunct="1">
@@ -3994,10 +4169,15 @@
             <p:ph type="ctrTitle"/>
           </p:nvPr>
         </p:nvSpPr>
-        <p:spPr/>
+        <p:spPr>
+          <a:xfrm>
+            <a:off x="204564" y="868362"/>
+            <a:ext cx="11782872" cy="2387600"/>
+          </a:xfrm>
+        </p:spPr>
         <p:txBody>
           <a:bodyPr>
-            <a:normAutofit fontScale="90000"/>
+            <a:normAutofit/>
           </a:bodyPr>
           <a:lstStyle/>
           <a:p>
@@ -4024,7 +4204,12 @@
             <p:ph type="subTitle" idx="1"/>
           </p:nvPr>
         </p:nvSpPr>
-        <p:spPr/>
+        <p:spPr>
+          <a:xfrm>
+            <a:off x="1524000" y="3847514"/>
+            <a:ext cx="9144000" cy="1655762"/>
+          </a:xfrm>
+        </p:spPr>
         <p:txBody>
           <a:bodyPr/>
           <a:lstStyle/>
@@ -4034,8 +4219,75 @@
               <a:t>Abbaas Alif Mohamed Nishar</a:t>
             </a:r>
           </a:p>
-        </p:txBody>
-      </p:sp>
+          <a:p>
+            <a:r>
+              <a:rPr lang="en-US" dirty="0"/>
+              <a:t>Department of Computer Science</a:t>
+            </a:r>
+          </a:p>
+          <a:p>
+            <a:r>
+              <a:rPr lang="en-US" dirty="0"/>
+              <a:t>April 16</a:t>
+            </a:r>
+            <a:r>
+              <a:rPr lang="en-US" baseline="30000" dirty="0"/>
+              <a:t>th</a:t>
+            </a:r>
+            <a:r>
+              <a:rPr lang="en-US" dirty="0"/>
+              <a:t>,2024</a:t>
+            </a:r>
+          </a:p>
+        </p:txBody>
+      </p:sp>
+      <p:pic>
+        <p:nvPicPr>
+          <p:cNvPr id="1026" name="Picture 2">
+            <a:extLst>
+              <a:ext uri="{FF2B5EF4-FFF2-40B4-BE49-F238E27FC236}">
+                <a16:creationId xmlns:a16="http://schemas.microsoft.com/office/drawing/2014/main" id="{6C7FC437-FF64-D408-9CD7-60DCA3D0A996}"/>
+              </a:ext>
+            </a:extLst>
+          </p:cNvPr>
+          <p:cNvPicPr>
+            <a:picLocks noChangeAspect="1" noChangeArrowheads="1"/>
+          </p:cNvPicPr>
+          <p:nvPr/>
+        </p:nvPicPr>
+        <p:blipFill>
+          <a:blip r:embed="rId2">
+            <a:extLst>
+              <a:ext uri="{28A0092B-C50C-407E-A947-70E740481C1C}">
+                <a14:useLocalDpi xmlns:a14="http://schemas.microsoft.com/office/drawing/2010/main" val="0"/>
+              </a:ext>
+            </a:extLst>
+          </a:blip>
+          <a:srcRect/>
+          <a:stretch>
+            <a:fillRect/>
+          </a:stretch>
+        </p:blipFill>
+        <p:spPr bwMode="auto">
+          <a:xfrm>
+            <a:off x="9035652" y="4477924"/>
+            <a:ext cx="3078957" cy="2380076"/>
+          </a:xfrm>
+          <a:prstGeom prst="rect">
+            <a:avLst/>
+          </a:prstGeom>
+          <a:noFill/>
+          <a:extLst>
+            <a:ext uri="{909E8E84-426E-40DD-AFC4-6F175D3DCCD1}">
+              <a14:hiddenFill xmlns:a14="http://schemas.microsoft.com/office/drawing/2010/main">
+                <a:solidFill>
+                  <a:srgbClr val="FFFFFF"/>
+                </a:solidFill>
+              </a14:hiddenFill>
+            </a:ext>
+          </a:extLst>
+        </p:spPr>
+      </p:pic>
     </p:spTree>
     <p:extLst>
       <p:ext uri="{BB962C8B-B14F-4D97-AF65-F5344CB8AC3E}">
@@ -4071,6 +4323,1361 @@
           <p:cNvPr id="2" name="Title 1">
             <a:extLst>
               <a:ext uri="{FF2B5EF4-FFF2-40B4-BE49-F238E27FC236}">
+                <a16:creationId xmlns:a16="http://schemas.microsoft.com/office/drawing/2014/main" id="{E47DEBAB-28F6-7F07-B08C-552343ED6F09}"/>
+              </a:ext>
+            </a:extLst>
+          </p:cNvPr>
+          <p:cNvSpPr>
+            <a:spLocks noGrp="1"/>
+          </p:cNvSpPr>
+          <p:nvPr>
+            <p:ph type="title"/>
+          </p:nvPr>
+        </p:nvSpPr>
+        <p:spPr>
+          <a:xfrm>
+            <a:off x="838200" y="0"/>
+            <a:ext cx="10515600" cy="1325563"/>
+          </a:xfrm>
+        </p:spPr>
+        <p:txBody>
+          <a:bodyPr/>
+          <a:lstStyle/>
+          <a:p>
+            <a:r>
+              <a:rPr lang="en-US" dirty="0"/>
+              <a:t>Modifications for Improvement</a:t>
+            </a:r>
+          </a:p>
+        </p:txBody>
+      </p:sp>
+      <p:sp>
+        <p:nvSpPr>
+          <p:cNvPr id="3" name="Rectangle: Rounded Corners 2">
+            <a:extLst>
+              <a:ext uri="{FF2B5EF4-FFF2-40B4-BE49-F238E27FC236}">
+                <a16:creationId xmlns:a16="http://schemas.microsoft.com/office/drawing/2014/main" id="{2A80AB20-D356-2EA4-6986-1B7DB9171114}"/>
+              </a:ext>
+            </a:extLst>
+          </p:cNvPr>
+          <p:cNvSpPr/>
+          <p:nvPr/>
+        </p:nvSpPr>
+        <p:spPr>
+          <a:xfrm>
+            <a:off x="773251" y="945085"/>
+            <a:ext cx="3228016" cy="5615274"/>
+          </a:xfrm>
+          <a:prstGeom prst="roundRect">
+            <a:avLst/>
+          </a:prstGeom>
+          <a:solidFill>
+            <a:schemeClr val="accent1">
+              <a:lumMod val="40000"/>
+              <a:lumOff val="60000"/>
+            </a:schemeClr>
+          </a:solidFill>
+        </p:spPr>
+        <p:style>
+          <a:lnRef idx="2">
+            <a:schemeClr val="accent6">
+              <a:shade val="15000"/>
+            </a:schemeClr>
+          </a:lnRef>
+          <a:fillRef idx="1">
+            <a:schemeClr val="accent6"/>
+          </a:fillRef>
+          <a:effectRef idx="0">
+            <a:schemeClr val="accent6"/>
+          </a:effectRef>
+          <a:fontRef idx="minor">
+            <a:schemeClr val="lt1"/>
+          </a:fontRef>
+        </p:style>
+        <p:txBody>
+          <a:bodyPr rtlCol="0" anchor="ctr"/>
+          <a:lstStyle/>
+          <a:p>
+            <a:r>
+              <a:rPr lang="en-US" sz="1400" b="1" u="sng" dirty="0">
+                <a:solidFill>
+                  <a:schemeClr val="tx1"/>
+                </a:solidFill>
+              </a:rPr>
+              <a:t>Modification1: </a:t>
+            </a:r>
+          </a:p>
+          <a:p>
+            <a:r>
+              <a:rPr lang="en-US" sz="1400" b="1" dirty="0">
+                <a:solidFill>
+                  <a:schemeClr val="tx1"/>
+                </a:solidFill>
+              </a:rPr>
+              <a:t>Labeled loss: </a:t>
+            </a:r>
+            <a:r>
+              <a:rPr lang="en-US" sz="1400" dirty="0">
+                <a:solidFill>
+                  <a:schemeClr val="tx1"/>
+                </a:solidFill>
+              </a:rPr>
+              <a:t>added label smoothing parameter</a:t>
+            </a:r>
+          </a:p>
+          <a:p>
+            <a:endParaRPr lang="en-US" sz="1400" dirty="0">
+              <a:solidFill>
+                <a:schemeClr val="tx1"/>
+              </a:solidFill>
+            </a:endParaRPr>
+          </a:p>
+          <a:p>
+            <a:r>
+              <a:rPr lang="en-US" sz="1400" b="1" dirty="0">
+                <a:solidFill>
+                  <a:schemeClr val="tx1"/>
+                </a:solidFill>
+              </a:rPr>
+              <a:t>Consistency Loss: </a:t>
+            </a:r>
+            <a:r>
+              <a:rPr lang="en-US" sz="1200" b="1" dirty="0">
+                <a:solidFill>
+                  <a:schemeClr val="tx1"/>
+                </a:solidFill>
+              </a:rPr>
+              <a:t>Enhanced Mask usage: </a:t>
+            </a:r>
+            <a:r>
+              <a:rPr lang="en-US" sz="1200" dirty="0">
+                <a:solidFill>
+                  <a:schemeClr val="tx1"/>
+                </a:solidFill>
+              </a:rPr>
+              <a:t>used SoftMax weights</a:t>
+            </a:r>
+            <a:endParaRPr lang="en-US" sz="1400" dirty="0">
+              <a:solidFill>
+                <a:schemeClr val="tx1"/>
+              </a:solidFill>
+            </a:endParaRPr>
+          </a:p>
+          <a:p>
+            <a:r>
+              <a:rPr lang="en-US" sz="1200" b="1" dirty="0">
+                <a:solidFill>
+                  <a:schemeClr val="tx1"/>
+                </a:solidFill>
+              </a:rPr>
+              <a:t>Consistency Loss: </a:t>
+            </a:r>
+            <a:r>
+              <a:rPr lang="en-US" sz="1200" dirty="0">
+                <a:solidFill>
+                  <a:schemeClr val="tx1"/>
+                </a:solidFill>
+              </a:rPr>
+              <a:t>make the logits smoother (worst idea ever!!!) (</a:t>
+            </a:r>
+            <a:r>
+              <a:rPr lang="en-US" sz="1200" dirty="0">
+                <a:solidFill>
+                  <a:srgbClr val="FF0000"/>
+                </a:solidFill>
+              </a:rPr>
+              <a:t>I was not sure what I was thinking</a:t>
+            </a:r>
+            <a:r>
+              <a:rPr lang="en-US" sz="1200" dirty="0">
+                <a:solidFill>
+                  <a:schemeClr val="tx1"/>
+                </a:solidFill>
+              </a:rPr>
+              <a:t>)</a:t>
+            </a:r>
+            <a:endParaRPr lang="en-US" sz="1400" dirty="0">
+              <a:solidFill>
+                <a:schemeClr val="tx1"/>
+              </a:solidFill>
+            </a:endParaRPr>
+          </a:p>
+          <a:p>
+            <a:r>
+              <a:rPr lang="en-US" sz="1200" b="1" dirty="0">
+                <a:solidFill>
+                  <a:schemeClr val="tx1"/>
+                </a:solidFill>
+              </a:rPr>
+              <a:t>L2 regularization: </a:t>
+            </a:r>
+            <a:r>
+              <a:rPr lang="en-US" sz="1200" dirty="0">
+                <a:solidFill>
+                  <a:schemeClr val="tx1"/>
+                </a:solidFill>
+              </a:rPr>
+              <a:t>Not bad! Prevents overfitting </a:t>
+            </a:r>
+          </a:p>
+          <a:p>
+            <a:endParaRPr lang="en-US" sz="1200" dirty="0">
+              <a:solidFill>
+                <a:schemeClr val="tx1"/>
+              </a:solidFill>
+            </a:endParaRPr>
+          </a:p>
+          <a:p>
+            <a:r>
+              <a:rPr lang="en-US" sz="1400" b="1" dirty="0">
+                <a:solidFill>
+                  <a:schemeClr val="tx1"/>
+                </a:solidFill>
+              </a:rPr>
+              <a:t>SAF loss:</a:t>
+            </a:r>
+          </a:p>
+          <a:p>
+            <a:r>
+              <a:rPr lang="en-US" sz="1200" b="1" dirty="0">
+                <a:solidFill>
+                  <a:schemeClr val="tx1"/>
+                </a:solidFill>
+              </a:rPr>
+              <a:t>Self Entropy: </a:t>
+            </a:r>
+            <a:r>
+              <a:rPr lang="en-US" sz="1200" dirty="0">
+                <a:solidFill>
+                  <a:schemeClr val="tx1"/>
+                </a:solidFill>
+              </a:rPr>
+              <a:t>calculate entropy of predicted probabilities for diversity</a:t>
+            </a:r>
+          </a:p>
+          <a:p>
+            <a:r>
+              <a:rPr lang="en-US" sz="1200" b="1" dirty="0">
+                <a:solidFill>
+                  <a:schemeClr val="tx1"/>
+                </a:solidFill>
+              </a:rPr>
+              <a:t>KL divergence: </a:t>
+            </a:r>
+            <a:r>
+              <a:rPr lang="en-US" sz="1200" dirty="0">
+                <a:solidFill>
+                  <a:schemeClr val="tx1"/>
+                </a:solidFill>
+              </a:rPr>
+              <a:t>for additional </a:t>
+            </a:r>
+            <a:r>
+              <a:rPr lang="en-US" sz="1200" dirty="0" err="1">
+                <a:solidFill>
+                  <a:schemeClr val="tx1"/>
+                </a:solidFill>
+              </a:rPr>
+              <a:t>regualization</a:t>
+            </a:r>
+            <a:r>
+              <a:rPr lang="en-US" sz="1200" dirty="0">
+                <a:solidFill>
+                  <a:schemeClr val="tx1"/>
+                </a:solidFill>
+              </a:rPr>
+              <a:t>.</a:t>
+            </a:r>
+          </a:p>
+          <a:p>
+            <a:endParaRPr lang="en-US" sz="1200" dirty="0">
+              <a:solidFill>
+                <a:schemeClr val="tx1"/>
+              </a:solidFill>
+            </a:endParaRPr>
+          </a:p>
+          <a:p>
+            <a:r>
+              <a:rPr lang="en-US" sz="1400" b="1" dirty="0">
+                <a:solidFill>
+                  <a:schemeClr val="tx1"/>
+                </a:solidFill>
+              </a:rPr>
+              <a:t>SAT loss:</a:t>
+            </a:r>
+          </a:p>
+          <a:p>
+            <a:r>
+              <a:rPr lang="en-US" sz="1200" b="1" dirty="0">
+                <a:solidFill>
+                  <a:schemeClr val="tx1"/>
+                </a:solidFill>
+              </a:rPr>
+              <a:t>Temperature to logits: </a:t>
+            </a:r>
+            <a:r>
+              <a:rPr lang="en-US" sz="1200" dirty="0">
+                <a:solidFill>
+                  <a:schemeClr val="tx1"/>
+                </a:solidFill>
+              </a:rPr>
+              <a:t>added temperature for regularization.</a:t>
+            </a:r>
+          </a:p>
+          <a:p>
+            <a:endParaRPr lang="en-US" sz="1200" b="1" dirty="0">
+              <a:solidFill>
+                <a:schemeClr val="tx1"/>
+              </a:solidFill>
+            </a:endParaRPr>
+          </a:p>
+          <a:p>
+            <a:r>
+              <a:rPr lang="en-US" sz="1200" b="1" dirty="0">
+                <a:solidFill>
+                  <a:schemeClr val="tx1"/>
+                </a:solidFill>
+              </a:rPr>
+              <a:t>Diversity Loss:</a:t>
+            </a:r>
+          </a:p>
+          <a:p>
+            <a:r>
+              <a:rPr lang="en-US" sz="1200" dirty="0">
+                <a:solidFill>
+                  <a:schemeClr val="tx1"/>
+                </a:solidFill>
+              </a:rPr>
+              <a:t>mean(sum(</a:t>
+            </a:r>
+            <a:r>
+              <a:rPr lang="en-US" sz="1200" dirty="0" err="1">
+                <a:solidFill>
+                  <a:schemeClr val="tx1"/>
+                </a:solidFill>
+              </a:rPr>
+              <a:t>softmax</a:t>
+            </a:r>
+            <a:r>
+              <a:rPr lang="en-US" sz="1200" dirty="0">
+                <a:solidFill>
+                  <a:schemeClr val="tx1"/>
+                </a:solidFill>
+              </a:rPr>
+              <a:t>(logits)*</a:t>
+            </a:r>
+            <a:r>
+              <a:rPr lang="en-US" sz="1200" dirty="0" err="1">
+                <a:solidFill>
+                  <a:schemeClr val="tx1"/>
+                </a:solidFill>
+              </a:rPr>
+              <a:t>logsoftmax</a:t>
+            </a:r>
+            <a:r>
+              <a:rPr lang="en-US" sz="1200" dirty="0">
+                <a:solidFill>
+                  <a:schemeClr val="tx1"/>
+                </a:solidFill>
+              </a:rPr>
+              <a:t>(logits))</a:t>
+            </a:r>
+            <a:endParaRPr lang="en-US" sz="1200" b="1" dirty="0">
+              <a:solidFill>
+                <a:schemeClr val="tx1"/>
+              </a:solidFill>
+            </a:endParaRPr>
+          </a:p>
+          <a:p>
+            <a:endParaRPr lang="en-US" sz="1200" b="1" dirty="0">
+              <a:solidFill>
+                <a:srgbClr val="FF0000"/>
+              </a:solidFill>
+            </a:endParaRPr>
+          </a:p>
+          <a:p>
+            <a:r>
+              <a:rPr lang="en-US" sz="1200" b="1" dirty="0">
+                <a:solidFill>
+                  <a:srgbClr val="FF0000"/>
+                </a:solidFill>
+              </a:rPr>
+              <a:t>Worst Idea ever!!! Completely performed bad from original</a:t>
+            </a:r>
+          </a:p>
+          <a:p>
+            <a:r>
+              <a:rPr lang="en-US" sz="1400" dirty="0">
+                <a:solidFill>
+                  <a:schemeClr val="tx1"/>
+                </a:solidFill>
+              </a:rPr>
+              <a:t> </a:t>
+            </a:r>
+          </a:p>
+        </p:txBody>
+      </p:sp>
+      <p:sp>
+        <p:nvSpPr>
+          <p:cNvPr id="4" name="Rectangle: Rounded Corners 3">
+            <a:extLst>
+              <a:ext uri="{FF2B5EF4-FFF2-40B4-BE49-F238E27FC236}">
+                <a16:creationId xmlns:a16="http://schemas.microsoft.com/office/drawing/2014/main" id="{39C19363-CC04-7270-DF3A-79E20065A321}"/>
+              </a:ext>
+            </a:extLst>
+          </p:cNvPr>
+          <p:cNvSpPr/>
+          <p:nvPr/>
+        </p:nvSpPr>
+        <p:spPr>
+          <a:xfrm>
+            <a:off x="4325501" y="945085"/>
+            <a:ext cx="3228016" cy="5615274"/>
+          </a:xfrm>
+          <a:prstGeom prst="roundRect">
+            <a:avLst/>
+          </a:prstGeom>
+          <a:solidFill>
+            <a:srgbClr val="FF99FF"/>
+          </a:solidFill>
+        </p:spPr>
+        <p:style>
+          <a:lnRef idx="2">
+            <a:schemeClr val="accent6">
+              <a:shade val="15000"/>
+            </a:schemeClr>
+          </a:lnRef>
+          <a:fillRef idx="1">
+            <a:schemeClr val="accent6"/>
+          </a:fillRef>
+          <a:effectRef idx="0">
+            <a:schemeClr val="accent6"/>
+          </a:effectRef>
+          <a:fontRef idx="minor">
+            <a:schemeClr val="lt1"/>
+          </a:fontRef>
+        </p:style>
+        <p:txBody>
+          <a:bodyPr rtlCol="0" anchor="ctr"/>
+          <a:lstStyle/>
+          <a:p>
+            <a:r>
+              <a:rPr lang="en-US" sz="1600" b="1" u="sng" dirty="0">
+                <a:solidFill>
+                  <a:schemeClr val="tx1"/>
+                </a:solidFill>
+              </a:rPr>
+              <a:t>Modification 2: </a:t>
+            </a:r>
+          </a:p>
+          <a:p>
+            <a:r>
+              <a:rPr lang="en-US" sz="1600" b="1" dirty="0">
+                <a:solidFill>
+                  <a:schemeClr val="tx1"/>
+                </a:solidFill>
+              </a:rPr>
+              <a:t>Labeled loss: </a:t>
+            </a:r>
+            <a:r>
+              <a:rPr lang="en-US" sz="1600" dirty="0">
+                <a:solidFill>
+                  <a:schemeClr val="tx1"/>
+                </a:solidFill>
+              </a:rPr>
+              <a:t>as original removed label smoothing</a:t>
+            </a:r>
+          </a:p>
+          <a:p>
+            <a:endParaRPr lang="en-US" sz="1600" dirty="0">
+              <a:solidFill>
+                <a:schemeClr val="tx1"/>
+              </a:solidFill>
+            </a:endParaRPr>
+          </a:p>
+          <a:p>
+            <a:r>
+              <a:rPr lang="en-US" sz="1600" b="1" dirty="0">
+                <a:solidFill>
+                  <a:schemeClr val="tx1"/>
+                </a:solidFill>
+              </a:rPr>
+              <a:t>Consistency Loss: </a:t>
+            </a:r>
+          </a:p>
+          <a:p>
+            <a:r>
+              <a:rPr lang="en-US" sz="1400" b="1" dirty="0">
+                <a:solidFill>
+                  <a:schemeClr val="tx1"/>
+                </a:solidFill>
+              </a:rPr>
+              <a:t>L2 regularization: </a:t>
+            </a:r>
+            <a:r>
+              <a:rPr lang="en-US" sz="1400" dirty="0">
+                <a:solidFill>
+                  <a:schemeClr val="tx1"/>
+                </a:solidFill>
+              </a:rPr>
+              <a:t>Not bad! Prevents overfitting </a:t>
+            </a:r>
+          </a:p>
+          <a:p>
+            <a:endParaRPr lang="en-US" sz="1400" dirty="0">
+              <a:solidFill>
+                <a:schemeClr val="tx1"/>
+              </a:solidFill>
+            </a:endParaRPr>
+          </a:p>
+          <a:p>
+            <a:r>
+              <a:rPr lang="en-US" sz="1600" b="1" dirty="0">
+                <a:solidFill>
+                  <a:schemeClr val="tx1"/>
+                </a:solidFill>
+              </a:rPr>
+              <a:t>SAF loss:</a:t>
+            </a:r>
+          </a:p>
+          <a:p>
+            <a:r>
+              <a:rPr lang="en-US" sz="1400" b="1" dirty="0">
+                <a:solidFill>
+                  <a:schemeClr val="tx1"/>
+                </a:solidFill>
+              </a:rPr>
+              <a:t>Self Entropy: </a:t>
+            </a:r>
+            <a:r>
+              <a:rPr lang="en-US" sz="1400" dirty="0">
+                <a:solidFill>
+                  <a:schemeClr val="tx1"/>
+                </a:solidFill>
+              </a:rPr>
+              <a:t>calculate entropy of predicted probabilities for diversity</a:t>
+            </a:r>
+          </a:p>
+          <a:p>
+            <a:r>
+              <a:rPr lang="en-US" sz="1400" b="1" dirty="0">
+                <a:solidFill>
+                  <a:schemeClr val="tx1"/>
+                </a:solidFill>
+              </a:rPr>
+              <a:t>KL divergence: </a:t>
+            </a:r>
+            <a:r>
+              <a:rPr lang="en-US" sz="1400" dirty="0">
+                <a:solidFill>
+                  <a:schemeClr val="tx1"/>
+                </a:solidFill>
+              </a:rPr>
+              <a:t>for additional </a:t>
+            </a:r>
+            <a:r>
+              <a:rPr lang="en-US" sz="1400" dirty="0" err="1">
+                <a:solidFill>
+                  <a:schemeClr val="tx1"/>
+                </a:solidFill>
+              </a:rPr>
+              <a:t>regualization</a:t>
+            </a:r>
+            <a:r>
+              <a:rPr lang="en-US" sz="1400" dirty="0">
+                <a:solidFill>
+                  <a:schemeClr val="tx1"/>
+                </a:solidFill>
+              </a:rPr>
+              <a:t>.</a:t>
+            </a:r>
+          </a:p>
+          <a:p>
+            <a:endParaRPr lang="en-US" sz="1400" dirty="0">
+              <a:solidFill>
+                <a:schemeClr val="tx1"/>
+              </a:solidFill>
+            </a:endParaRPr>
+          </a:p>
+          <a:p>
+            <a:r>
+              <a:rPr lang="en-US" sz="1600" b="1" dirty="0">
+                <a:solidFill>
+                  <a:schemeClr val="tx1"/>
+                </a:solidFill>
+              </a:rPr>
+              <a:t>SAT loss:</a:t>
+            </a:r>
+          </a:p>
+          <a:p>
+            <a:endParaRPr lang="en-US" sz="1400" b="1" dirty="0">
+              <a:solidFill>
+                <a:schemeClr val="tx1"/>
+              </a:solidFill>
+            </a:endParaRPr>
+          </a:p>
+          <a:p>
+            <a:r>
+              <a:rPr lang="en-US" sz="1400" b="1" dirty="0">
+                <a:solidFill>
+                  <a:schemeClr val="tx1"/>
+                </a:solidFill>
+              </a:rPr>
+              <a:t>Diversity Loss:</a:t>
+            </a:r>
+          </a:p>
+          <a:p>
+            <a:r>
+              <a:rPr lang="en-US" sz="1400" dirty="0">
+                <a:solidFill>
+                  <a:schemeClr val="tx1"/>
+                </a:solidFill>
+              </a:rPr>
+              <a:t>mean(sum(</a:t>
+            </a:r>
+            <a:r>
+              <a:rPr lang="en-US" sz="1400" dirty="0" err="1">
+                <a:solidFill>
+                  <a:schemeClr val="tx1"/>
+                </a:solidFill>
+              </a:rPr>
+              <a:t>softmax</a:t>
+            </a:r>
+            <a:r>
+              <a:rPr lang="en-US" sz="1400" dirty="0">
+                <a:solidFill>
+                  <a:schemeClr val="tx1"/>
+                </a:solidFill>
+              </a:rPr>
+              <a:t>(logits)*</a:t>
+            </a:r>
+            <a:r>
+              <a:rPr lang="en-US" sz="1400" dirty="0" err="1">
+                <a:solidFill>
+                  <a:schemeClr val="tx1"/>
+                </a:solidFill>
+              </a:rPr>
+              <a:t>logsoftmax</a:t>
+            </a:r>
+            <a:r>
+              <a:rPr lang="en-US" sz="1400" dirty="0">
+                <a:solidFill>
+                  <a:schemeClr val="tx1"/>
+                </a:solidFill>
+              </a:rPr>
+              <a:t>(logits))</a:t>
+            </a:r>
+            <a:endParaRPr lang="en-US" sz="1400" b="1" dirty="0">
+              <a:solidFill>
+                <a:schemeClr val="tx1"/>
+              </a:solidFill>
+            </a:endParaRPr>
+          </a:p>
+          <a:p>
+            <a:endParaRPr lang="en-US" sz="1400" b="1" dirty="0">
+              <a:solidFill>
+                <a:srgbClr val="FF0000"/>
+              </a:solidFill>
+            </a:endParaRPr>
+          </a:p>
+          <a:p>
+            <a:r>
+              <a:rPr lang="en-US" sz="1400" b="1" dirty="0">
+                <a:solidFill>
+                  <a:srgbClr val="FF0000"/>
+                </a:solidFill>
+              </a:rPr>
+              <a:t>Performed better but still didn’t surpass original technique.</a:t>
+            </a:r>
+          </a:p>
+        </p:txBody>
+      </p:sp>
+      <p:sp>
+        <p:nvSpPr>
+          <p:cNvPr id="5" name="Rectangle: Rounded Corners 4">
+            <a:extLst>
+              <a:ext uri="{FF2B5EF4-FFF2-40B4-BE49-F238E27FC236}">
+                <a16:creationId xmlns:a16="http://schemas.microsoft.com/office/drawing/2014/main" id="{239076BC-4248-9E76-AB98-543DD05145C8}"/>
+              </a:ext>
+            </a:extLst>
+          </p:cNvPr>
+          <p:cNvSpPr/>
+          <p:nvPr/>
+        </p:nvSpPr>
+        <p:spPr>
+          <a:xfrm>
+            <a:off x="7877751" y="945085"/>
+            <a:ext cx="3228016" cy="5615274"/>
+          </a:xfrm>
+          <a:prstGeom prst="roundRect">
+            <a:avLst/>
+          </a:prstGeom>
+          <a:solidFill>
+            <a:srgbClr val="FFCC00"/>
+          </a:solidFill>
+        </p:spPr>
+        <p:style>
+          <a:lnRef idx="2">
+            <a:schemeClr val="accent6">
+              <a:shade val="15000"/>
+            </a:schemeClr>
+          </a:lnRef>
+          <a:fillRef idx="1">
+            <a:schemeClr val="accent6"/>
+          </a:fillRef>
+          <a:effectRef idx="0">
+            <a:schemeClr val="accent6"/>
+          </a:effectRef>
+          <a:fontRef idx="minor">
+            <a:schemeClr val="lt1"/>
+          </a:fontRef>
+        </p:style>
+        <p:txBody>
+          <a:bodyPr rtlCol="0" anchor="ctr"/>
+          <a:lstStyle/>
+          <a:p>
+            <a:r>
+              <a:rPr lang="en-US" sz="1600" b="1" u="sng" dirty="0">
+                <a:solidFill>
+                  <a:schemeClr val="tx1"/>
+                </a:solidFill>
+              </a:rPr>
+              <a:t>Modification 3: </a:t>
+            </a:r>
+          </a:p>
+          <a:p>
+            <a:r>
+              <a:rPr lang="en-US" sz="1600" b="1" dirty="0">
+                <a:solidFill>
+                  <a:schemeClr val="tx1"/>
+                </a:solidFill>
+              </a:rPr>
+              <a:t>Labeled loss:</a:t>
+            </a:r>
+            <a:r>
+              <a:rPr lang="en-US" sz="1600" dirty="0">
+                <a:solidFill>
+                  <a:schemeClr val="tx1"/>
+                </a:solidFill>
+              </a:rPr>
+              <a:t> as original</a:t>
+            </a:r>
+          </a:p>
+          <a:p>
+            <a:r>
+              <a:rPr lang="en-US" sz="1600" b="1" dirty="0">
+                <a:solidFill>
+                  <a:schemeClr val="tx1"/>
+                </a:solidFill>
+              </a:rPr>
+              <a:t>Consistency Loss: </a:t>
+            </a:r>
+          </a:p>
+          <a:p>
+            <a:r>
+              <a:rPr lang="en-US" sz="1400" dirty="0">
+                <a:solidFill>
+                  <a:schemeClr val="tx1"/>
+                </a:solidFill>
+              </a:rPr>
+              <a:t>As original</a:t>
+            </a:r>
+          </a:p>
+          <a:p>
+            <a:r>
+              <a:rPr lang="en-US" sz="1600" b="1" dirty="0">
+                <a:solidFill>
+                  <a:schemeClr val="tx1"/>
+                </a:solidFill>
+              </a:rPr>
+              <a:t>SAF loss:</a:t>
+            </a:r>
+          </a:p>
+          <a:p>
+            <a:r>
+              <a:rPr lang="en-US" sz="1400" dirty="0">
+                <a:solidFill>
+                  <a:schemeClr val="tx1"/>
+                </a:solidFill>
+              </a:rPr>
+              <a:t>As original</a:t>
+            </a:r>
+          </a:p>
+          <a:p>
+            <a:r>
+              <a:rPr lang="en-US" sz="1600" b="1" dirty="0">
+                <a:solidFill>
+                  <a:schemeClr val="tx1"/>
+                </a:solidFill>
+              </a:rPr>
+              <a:t>SAT loss:</a:t>
+            </a:r>
+          </a:p>
+          <a:p>
+            <a:r>
+              <a:rPr lang="en-US" sz="1400" b="1" dirty="0">
+                <a:solidFill>
+                  <a:schemeClr val="tx1"/>
+                </a:solidFill>
+              </a:rPr>
+              <a:t>Added an attention layer for samples: </a:t>
+            </a:r>
+            <a:r>
+              <a:rPr lang="en-US" sz="1400" dirty="0">
+                <a:solidFill>
+                  <a:schemeClr val="tx1"/>
+                </a:solidFill>
+              </a:rPr>
+              <a:t>A single attention layer that will look for important samples to focus on and boost their logits, hence altering global temperatures.</a:t>
+            </a:r>
+          </a:p>
+          <a:p>
+            <a:endParaRPr lang="en-US" sz="1400" b="1" dirty="0">
+              <a:solidFill>
+                <a:schemeClr val="tx1"/>
+              </a:solidFill>
+            </a:endParaRPr>
+          </a:p>
+          <a:p>
+            <a:r>
+              <a:rPr lang="en-US" sz="1400" b="1" dirty="0">
+                <a:solidFill>
+                  <a:srgbClr val="FF0000"/>
+                </a:solidFill>
+              </a:rPr>
+              <a:t>Performed better than Mod 1 and Outperformed Mod2 until a point and then saturated. Root cause the Attention layer did not let the global temperature go up causing sub optimal performance.</a:t>
+            </a:r>
+          </a:p>
+          <a:p>
+            <a:endParaRPr lang="en-US" sz="1400" b="1" dirty="0">
+              <a:solidFill>
+                <a:srgbClr val="FF0000"/>
+              </a:solidFill>
+            </a:endParaRPr>
+          </a:p>
+        </p:txBody>
+      </p:sp>
+      <p:sp>
+        <p:nvSpPr>
+          <p:cNvPr id="6" name="Slide Number Placeholder 5">
+            <a:extLst>
+              <a:ext uri="{FF2B5EF4-FFF2-40B4-BE49-F238E27FC236}">
+                <a16:creationId xmlns:a16="http://schemas.microsoft.com/office/drawing/2014/main" id="{6551B591-2E80-9DA1-D86C-C141ABFD91EB}"/>
+              </a:ext>
+            </a:extLst>
+          </p:cNvPr>
+          <p:cNvSpPr>
+            <a:spLocks noGrp="1"/>
+          </p:cNvSpPr>
+          <p:nvPr>
+            <p:ph type="sldNum" sz="quarter" idx="12"/>
+          </p:nvPr>
+        </p:nvSpPr>
+        <p:spPr/>
+        <p:txBody>
+          <a:bodyPr/>
+          <a:lstStyle/>
+          <a:p>
+            <a:fld id="{C4AA1B3F-5DB5-4716-98C6-6D5158A1131F}" type="slidenum">
+              <a:rPr lang="en-US" smtClean="0"/>
+              <a:t>10</a:t>
+            </a:fld>
+            <a:endParaRPr lang="en-US"/>
+          </a:p>
+        </p:txBody>
+      </p:sp>
+    </p:spTree>
+    <p:extLst>
+      <p:ext uri="{BB962C8B-B14F-4D97-AF65-F5344CB8AC3E}">
+        <p14:creationId xmlns:p14="http://schemas.microsoft.com/office/powerpoint/2010/main" val="3510635656"/>
+      </p:ext>
+    </p:extLst>
+  </p:cSld>
+  <p:clrMapOvr>
+    <a:masterClrMapping/>
+  </p:clrMapOvr>
+  <p:timing>
+    <p:tnLst>
+      <p:par>
+        <p:cTn id="1" dur="indefinite" restart="never" nodeType="tmRoot">
+          <p:childTnLst>
+            <p:seq concurrent="1" nextAc="seek">
+              <p:cTn id="2" dur="indefinite" nodeType="mainSeq">
+                <p:childTnLst>
+                  <p:par>
+                    <p:cTn id="3" fill="hold">
+                      <p:stCondLst>
+                        <p:cond delay="indefinite"/>
+                      </p:stCondLst>
+                      <p:childTnLst>
+                        <p:par>
+                          <p:cTn id="4" fill="hold">
+                            <p:stCondLst>
+                              <p:cond delay="0"/>
+                            </p:stCondLst>
+                            <p:childTnLst>
+                              <p:par>
+                                <p:cTn id="5" presetID="1" presetClass="entr" presetSubtype="0" fill="hold" grpId="0" nodeType="clickEffect">
+                                  <p:stCondLst>
+                                    <p:cond delay="0"/>
+                                  </p:stCondLst>
+                                  <p:childTnLst>
+                                    <p:set>
+                                      <p:cBhvr>
+                                        <p:cTn id="6" dur="1" fill="hold">
+                                          <p:stCondLst>
+                                            <p:cond delay="0"/>
+                                          </p:stCondLst>
+                                        </p:cTn>
+                                        <p:tgtEl>
+                                          <p:spTgt spid="3"/>
+                                        </p:tgtEl>
+                                        <p:attrNameLst>
+                                          <p:attrName>style.visibility</p:attrName>
+                                        </p:attrNameLst>
+                                      </p:cBhvr>
+                                      <p:to>
+                                        <p:strVal val="visible"/>
+                                      </p:to>
+                                    </p:set>
+                                  </p:childTnLst>
+                                </p:cTn>
+                              </p:par>
+                            </p:childTnLst>
+                          </p:cTn>
+                        </p:par>
+                      </p:childTnLst>
+                    </p:cTn>
+                  </p:par>
+                  <p:par>
+                    <p:cTn id="7" fill="hold">
+                      <p:stCondLst>
+                        <p:cond delay="indefinite"/>
+                      </p:stCondLst>
+                      <p:childTnLst>
+                        <p:par>
+                          <p:cTn id="8" fill="hold">
+                            <p:stCondLst>
+                              <p:cond delay="0"/>
+                            </p:stCondLst>
+                            <p:childTnLst>
+                              <p:par>
+                                <p:cTn id="9" presetID="1" presetClass="entr" presetSubtype="0" fill="hold" grpId="0" nodeType="clickEffect">
+                                  <p:stCondLst>
+                                    <p:cond delay="0"/>
+                                  </p:stCondLst>
+                                  <p:childTnLst>
+                                    <p:set>
+                                      <p:cBhvr>
+                                        <p:cTn id="10" dur="1" fill="hold">
+                                          <p:stCondLst>
+                                            <p:cond delay="0"/>
+                                          </p:stCondLst>
+                                        </p:cTn>
+                                        <p:tgtEl>
+                                          <p:spTgt spid="4"/>
+                                        </p:tgtEl>
+                                        <p:attrNameLst>
+                                          <p:attrName>style.visibility</p:attrName>
+                                        </p:attrNameLst>
+                                      </p:cBhvr>
+                                      <p:to>
+                                        <p:strVal val="visible"/>
+                                      </p:to>
+                                    </p:set>
+                                  </p:childTnLst>
+                                </p:cTn>
+                              </p:par>
+                            </p:childTnLst>
+                          </p:cTn>
+                        </p:par>
+                      </p:childTnLst>
+                    </p:cTn>
+                  </p:par>
+                  <p:par>
+                    <p:cTn id="11" fill="hold">
+                      <p:stCondLst>
+                        <p:cond delay="indefinite"/>
+                      </p:stCondLst>
+                      <p:childTnLst>
+                        <p:par>
+                          <p:cTn id="12" fill="hold">
+                            <p:stCondLst>
+                              <p:cond delay="0"/>
+                            </p:stCondLst>
+                            <p:childTnLst>
+                              <p:par>
+                                <p:cTn id="13" presetID="1" presetClass="entr" presetSubtype="0" fill="hold" grpId="0" nodeType="clickEffect">
+                                  <p:stCondLst>
+                                    <p:cond delay="0"/>
+                                  </p:stCondLst>
+                                  <p:childTnLst>
+                                    <p:set>
+                                      <p:cBhvr>
+                                        <p:cTn id="14" dur="1" fill="hold">
+                                          <p:stCondLst>
+                                            <p:cond delay="0"/>
+                                          </p:stCondLst>
+                                        </p:cTn>
+                                        <p:tgtEl>
+                                          <p:spTgt spid="5"/>
+                                        </p:tgtEl>
+                                        <p:attrNameLst>
+                                          <p:attrName>style.visibility</p:attrName>
+                                        </p:attrNameLst>
+                                      </p:cBhvr>
+                                      <p:to>
+                                        <p:strVal val="visible"/>
+                                      </p:to>
+                                    </p:set>
+                                  </p:childTnLst>
+                                </p:cTn>
+                              </p:par>
+                            </p:childTnLst>
+                          </p:cTn>
+                        </p:par>
+                      </p:childTnLst>
+                    </p:cTn>
+                  </p:par>
+                </p:childTnLst>
+              </p:cTn>
+              <p:prevCondLst>
+                <p:cond evt="onPrev" delay="0">
+                  <p:tgtEl>
+                    <p:sldTgt/>
+                  </p:tgtEl>
+                </p:cond>
+              </p:prevCondLst>
+              <p:nextCondLst>
+                <p:cond evt="onNext" delay="0">
+                  <p:tgtEl>
+                    <p:sldTgt/>
+                  </p:tgtEl>
+                </p:cond>
+              </p:nextCondLst>
+            </p:seq>
+          </p:childTnLst>
+        </p:cTn>
+      </p:par>
+    </p:tnLst>
+    <p:bldLst>
+      <p:bldP spid="3" grpId="0" animBg="1"/>
+      <p:bldP spid="4" grpId="0" animBg="1"/>
+      <p:bldP spid="5" grpId="0" animBg="1"/>
+    </p:bldLst>
+  </p:timing>
+</p:sld>
+</file>
+
+<file path=ppt/slides/slide11.xml><?xml version="1.0" encoding="utf-8"?>
+<p:sld xmlns:a="http://schemas.openxmlformats.org/drawingml/2006/main" xmlns:r="http://schemas.openxmlformats.org/officeDocument/2006/relationships" xmlns:p="http://schemas.openxmlformats.org/presentationml/2006/main">
+  <p:cSld>
+    <p:spTree>
+      <p:nvGrpSpPr>
+        <p:cNvPr id="1" name=""/>
+        <p:cNvGrpSpPr/>
+        <p:nvPr/>
+      </p:nvGrpSpPr>
+      <p:grpSpPr>
+        <a:xfrm>
+          <a:off x="0" y="0"/>
+          <a:ext cx="0" cy="0"/>
+          <a:chOff x="0" y="0"/>
+          <a:chExt cx="0" cy="0"/>
+        </a:xfrm>
+      </p:grpSpPr>
+      <p:sp>
+        <p:nvSpPr>
+          <p:cNvPr id="2" name="Title 1">
+            <a:extLst>
+              <a:ext uri="{FF2B5EF4-FFF2-40B4-BE49-F238E27FC236}">
+                <a16:creationId xmlns:a16="http://schemas.microsoft.com/office/drawing/2014/main" id="{37DA4A1A-6514-E4EE-6816-B415BBEF067A}"/>
+              </a:ext>
+            </a:extLst>
+          </p:cNvPr>
+          <p:cNvSpPr>
+            <a:spLocks noGrp="1"/>
+          </p:cNvSpPr>
+          <p:nvPr>
+            <p:ph type="title"/>
+          </p:nvPr>
+        </p:nvSpPr>
+        <p:spPr>
+          <a:xfrm>
+            <a:off x="838200" y="365125"/>
+            <a:ext cx="10515600" cy="1058639"/>
+          </a:xfrm>
+        </p:spPr>
+        <p:txBody>
+          <a:bodyPr/>
+          <a:lstStyle/>
+          <a:p>
+            <a:r>
+              <a:rPr lang="en-US" dirty="0"/>
+              <a:t>Results</a:t>
+            </a:r>
+          </a:p>
+        </p:txBody>
+      </p:sp>
+      <p:sp>
+        <p:nvSpPr>
+          <p:cNvPr id="3" name="Slide Number Placeholder 2">
+            <a:extLst>
+              <a:ext uri="{FF2B5EF4-FFF2-40B4-BE49-F238E27FC236}">
+                <a16:creationId xmlns:a16="http://schemas.microsoft.com/office/drawing/2014/main" id="{514A2D4C-DB38-23D1-B40A-5C9A3E893FE7}"/>
+              </a:ext>
+            </a:extLst>
+          </p:cNvPr>
+          <p:cNvSpPr>
+            <a:spLocks noGrp="1"/>
+          </p:cNvSpPr>
+          <p:nvPr>
+            <p:ph type="sldNum" sz="quarter" idx="12"/>
+          </p:nvPr>
+        </p:nvSpPr>
+        <p:spPr/>
+        <p:txBody>
+          <a:bodyPr/>
+          <a:lstStyle/>
+          <a:p>
+            <a:fld id="{C4AA1B3F-5DB5-4716-98C6-6D5158A1131F}" type="slidenum">
+              <a:rPr lang="en-US" smtClean="0"/>
+              <a:t>11</a:t>
+            </a:fld>
+            <a:endParaRPr lang="en-US"/>
+          </a:p>
+        </p:txBody>
+      </p:sp>
+      <p:pic>
+        <p:nvPicPr>
+          <p:cNvPr id="5" name="Picture 4">
+            <a:extLst>
+              <a:ext uri="{FF2B5EF4-FFF2-40B4-BE49-F238E27FC236}">
+                <a16:creationId xmlns:a16="http://schemas.microsoft.com/office/drawing/2014/main" id="{4F8667E7-B866-E58A-16C5-9F242E22C9D6}"/>
+              </a:ext>
+            </a:extLst>
+          </p:cNvPr>
+          <p:cNvPicPr>
+            <a:picLocks noChangeAspect="1"/>
+          </p:cNvPicPr>
+          <p:nvPr/>
+        </p:nvPicPr>
+        <p:blipFill>
+          <a:blip r:embed="rId2"/>
+          <a:stretch>
+            <a:fillRect/>
+          </a:stretch>
+        </p:blipFill>
+        <p:spPr>
+          <a:xfrm>
+            <a:off x="1158621" y="1120656"/>
+            <a:ext cx="9874757" cy="4616687"/>
+          </a:xfrm>
+          <a:prstGeom prst="rect">
+            <a:avLst/>
+          </a:prstGeom>
+        </p:spPr>
+      </p:pic>
+      <p:sp>
+        <p:nvSpPr>
+          <p:cNvPr id="6" name="Rectangle 5">
+            <a:extLst>
+              <a:ext uri="{FF2B5EF4-FFF2-40B4-BE49-F238E27FC236}">
+                <a16:creationId xmlns:a16="http://schemas.microsoft.com/office/drawing/2014/main" id="{7DEC69E2-51F3-FC55-DEB0-89D5789F0090}"/>
+              </a:ext>
+            </a:extLst>
+          </p:cNvPr>
+          <p:cNvSpPr/>
+          <p:nvPr/>
+        </p:nvSpPr>
+        <p:spPr>
+          <a:xfrm>
+            <a:off x="1270341" y="5001584"/>
+            <a:ext cx="9647227" cy="270024"/>
+          </a:xfrm>
+          <a:prstGeom prst="rect">
+            <a:avLst/>
+          </a:prstGeom>
+          <a:noFill/>
+          <a:ln>
+            <a:solidFill>
+              <a:srgbClr val="FF0000"/>
+            </a:solidFill>
+          </a:ln>
+        </p:spPr>
+        <p:style>
+          <a:lnRef idx="2">
+            <a:schemeClr val="accent1">
+              <a:shade val="15000"/>
+            </a:schemeClr>
+          </a:lnRef>
+          <a:fillRef idx="1">
+            <a:schemeClr val="accent1"/>
+          </a:fillRef>
+          <a:effectRef idx="0">
+            <a:schemeClr val="accent1"/>
+          </a:effectRef>
+          <a:fontRef idx="minor">
+            <a:schemeClr val="lt1"/>
+          </a:fontRef>
+        </p:style>
+        <p:txBody>
+          <a:bodyPr rtlCol="0" anchor="ctr"/>
+          <a:lstStyle/>
+          <a:p>
+            <a:pPr algn="ctr"/>
+            <a:endParaRPr lang="en-US"/>
+          </a:p>
+        </p:txBody>
+      </p:sp>
+      <p:sp>
+        <p:nvSpPr>
+          <p:cNvPr id="7" name="TextBox 6">
+            <a:extLst>
+              <a:ext uri="{FF2B5EF4-FFF2-40B4-BE49-F238E27FC236}">
+                <a16:creationId xmlns:a16="http://schemas.microsoft.com/office/drawing/2014/main" id="{3576F26B-B2CE-1432-0059-34B0150EE1C3}"/>
+              </a:ext>
+            </a:extLst>
+          </p:cNvPr>
+          <p:cNvSpPr txBox="1"/>
+          <p:nvPr/>
+        </p:nvSpPr>
+        <p:spPr>
+          <a:xfrm>
+            <a:off x="9874756" y="1124727"/>
+            <a:ext cx="1158622" cy="461665"/>
+          </a:xfrm>
+          <a:prstGeom prst="rect">
+            <a:avLst/>
+          </a:prstGeom>
+          <a:noFill/>
+        </p:spPr>
+        <p:txBody>
+          <a:bodyPr wrap="square" rtlCol="0">
+            <a:spAutoFit/>
+          </a:bodyPr>
+          <a:lstStyle/>
+          <a:p>
+            <a:r>
+              <a:rPr lang="en-US" sz="1200" dirty="0"/>
+              <a:t>Average Accuracy: 95.9</a:t>
+            </a:r>
+          </a:p>
+        </p:txBody>
+      </p:sp>
+    </p:spTree>
+    <p:extLst>
+      <p:ext uri="{BB962C8B-B14F-4D97-AF65-F5344CB8AC3E}">
+        <p14:creationId xmlns:p14="http://schemas.microsoft.com/office/powerpoint/2010/main" val="1058058098"/>
+      </p:ext>
+    </p:extLst>
+  </p:cSld>
+  <p:clrMapOvr>
+    <a:masterClrMapping/>
+  </p:clrMapOvr>
+  <p:timing>
+    <p:tnLst>
+      <p:par>
+        <p:cTn id="1" dur="indefinite" restart="never" nodeType="tmRoot">
+          <p:childTnLst>
+            <p:seq concurrent="1" nextAc="seek">
+              <p:cTn id="2" dur="indefinite" nodeType="mainSeq">
+                <p:childTnLst>
+                  <p:par>
+                    <p:cTn id="3" fill="hold">
+                      <p:stCondLst>
+                        <p:cond delay="indefinite"/>
+                      </p:stCondLst>
+                      <p:childTnLst>
+                        <p:par>
+                          <p:cTn id="4" fill="hold">
+                            <p:stCondLst>
+                              <p:cond delay="0"/>
+                            </p:stCondLst>
+                            <p:childTnLst>
+                              <p:par>
+                                <p:cTn id="5" presetID="1" presetClass="entr" presetSubtype="0" fill="hold" grpId="0" nodeType="clickEffect">
+                                  <p:stCondLst>
+                                    <p:cond delay="0"/>
+                                  </p:stCondLst>
+                                  <p:childTnLst>
+                                    <p:set>
+                                      <p:cBhvr>
+                                        <p:cTn id="6" dur="1" fill="hold">
+                                          <p:stCondLst>
+                                            <p:cond delay="0"/>
+                                          </p:stCondLst>
+                                        </p:cTn>
+                                        <p:tgtEl>
+                                          <p:spTgt spid="7"/>
+                                        </p:tgtEl>
+                                        <p:attrNameLst>
+                                          <p:attrName>style.visibility</p:attrName>
+                                        </p:attrNameLst>
+                                      </p:cBhvr>
+                                      <p:to>
+                                        <p:strVal val="visible"/>
+                                      </p:to>
+                                    </p:set>
+                                  </p:childTnLst>
+                                </p:cTn>
+                              </p:par>
+                            </p:childTnLst>
+                          </p:cTn>
+                        </p:par>
+                      </p:childTnLst>
+                    </p:cTn>
+                  </p:par>
+                </p:childTnLst>
+              </p:cTn>
+              <p:prevCondLst>
+                <p:cond evt="onPrev" delay="0">
+                  <p:tgtEl>
+                    <p:sldTgt/>
+                  </p:tgtEl>
+                </p:cond>
+              </p:prevCondLst>
+              <p:nextCondLst>
+                <p:cond evt="onNext" delay="0">
+                  <p:tgtEl>
+                    <p:sldTgt/>
+                  </p:tgtEl>
+                </p:cond>
+              </p:nextCondLst>
+            </p:seq>
+          </p:childTnLst>
+        </p:cTn>
+      </p:par>
+    </p:tnLst>
+    <p:bldLst>
+      <p:bldP spid="7" grpId="0"/>
+    </p:bldLst>
+  </p:timing>
+</p:sld>
+</file>
+
+<file path=ppt/slides/slide12.xml><?xml version="1.0" encoding="utf-8"?>
+<p:sld xmlns:a="http://schemas.openxmlformats.org/drawingml/2006/main" xmlns:r="http://schemas.openxmlformats.org/officeDocument/2006/relationships" xmlns:p="http://schemas.openxmlformats.org/presentationml/2006/main">
+  <p:cSld>
+    <p:spTree>
+      <p:nvGrpSpPr>
+        <p:cNvPr id="1" name=""/>
+        <p:cNvGrpSpPr/>
+        <p:nvPr/>
+      </p:nvGrpSpPr>
+      <p:grpSpPr>
+        <a:xfrm>
+          <a:off x="0" y="0"/>
+          <a:ext cx="0" cy="0"/>
+          <a:chOff x="0" y="0"/>
+          <a:chExt cx="0" cy="0"/>
+        </a:xfrm>
+      </p:grpSpPr>
+      <p:sp>
+        <p:nvSpPr>
+          <p:cNvPr id="2" name="Title 1">
+            <a:extLst>
+              <a:ext uri="{FF2B5EF4-FFF2-40B4-BE49-F238E27FC236}">
                 <a16:creationId xmlns:a16="http://schemas.microsoft.com/office/drawing/2014/main" id="{E34072EC-6433-C1ED-494F-ED68A965313E}"/>
               </a:ext>
             </a:extLst>
@@ -4095,6 +5702,35 @@
               <a:rPr lang="en-US" dirty="0"/>
               <a:t> and Questions</a:t>
             </a:r>
+          </a:p>
+        </p:txBody>
+      </p:sp>
+      <p:sp>
+        <p:nvSpPr>
+          <p:cNvPr id="3" name="Slide Number Placeholder 2">
+            <a:extLst>
+              <a:ext uri="{FF2B5EF4-FFF2-40B4-BE49-F238E27FC236}">
+                <a16:creationId xmlns:a16="http://schemas.microsoft.com/office/drawing/2014/main" id="{331EEF29-BB8D-E492-DD1D-1A0C32575382}"/>
+              </a:ext>
+            </a:extLst>
+          </p:cNvPr>
+          <p:cNvSpPr>
+            <a:spLocks noGrp="1"/>
+          </p:cNvSpPr>
+          <p:nvPr>
+            <p:ph type="sldNum" sz="quarter" idx="12"/>
+          </p:nvPr>
+        </p:nvSpPr>
+        <p:spPr/>
+        <p:txBody>
+          <a:bodyPr/>
+          <a:lstStyle/>
+          <a:p>
+            <a:fld id="{C4AA1B3F-5DB5-4716-98C6-6D5158A1131F}" type="slidenum">
+              <a:rPr lang="en-US" smtClean="0"/>
+              <a:t>12</a:t>
+            </a:fld>
+            <a:endParaRPr lang="en-US"/>
           </a:p>
         </p:txBody>
       </p:sp>
@@ -4424,6 +6060,35 @@
               <a:rPr lang="en-US" dirty="0"/>
               <a:t>Dataset</a:t>
             </a:r>
+          </a:p>
+        </p:txBody>
+      </p:sp>
+      <p:sp>
+        <p:nvSpPr>
+          <p:cNvPr id="3" name="Slide Number Placeholder 2">
+            <a:extLst>
+              <a:ext uri="{FF2B5EF4-FFF2-40B4-BE49-F238E27FC236}">
+                <a16:creationId xmlns:a16="http://schemas.microsoft.com/office/drawing/2014/main" id="{E7BBF423-468A-AC58-2990-531351347663}"/>
+              </a:ext>
+            </a:extLst>
+          </p:cNvPr>
+          <p:cNvSpPr>
+            <a:spLocks noGrp="1"/>
+          </p:cNvSpPr>
+          <p:nvPr>
+            <p:ph type="sldNum" sz="quarter" idx="12"/>
+          </p:nvPr>
+        </p:nvSpPr>
+        <p:spPr/>
+        <p:txBody>
+          <a:bodyPr/>
+          <a:lstStyle/>
+          <a:p>
+            <a:fld id="{C4AA1B3F-5DB5-4716-98C6-6D5158A1131F}" type="slidenum">
+              <a:rPr lang="en-US" smtClean="0"/>
+              <a:t>2</a:t>
+            </a:fld>
+            <a:endParaRPr lang="en-US"/>
           </a:p>
         </p:txBody>
       </p:sp>
@@ -4727,6 +6392,35 @@
           </a:prstGeom>
         </p:spPr>
       </p:pic>
+      <p:sp>
+        <p:nvSpPr>
+          <p:cNvPr id="2" name="Slide Number Placeholder 1">
+            <a:extLst>
+              <a:ext uri="{FF2B5EF4-FFF2-40B4-BE49-F238E27FC236}">
+                <a16:creationId xmlns:a16="http://schemas.microsoft.com/office/drawing/2014/main" id="{71B4C2B5-B77D-A0B5-5BBB-A20942FD9442}"/>
+              </a:ext>
+            </a:extLst>
+          </p:cNvPr>
+          <p:cNvSpPr>
+            <a:spLocks noGrp="1"/>
+          </p:cNvSpPr>
+          <p:nvPr>
+            <p:ph type="sldNum" sz="quarter" idx="12"/>
+          </p:nvPr>
+        </p:nvSpPr>
+        <p:spPr/>
+        <p:txBody>
+          <a:bodyPr/>
+          <a:lstStyle/>
+          <a:p>
+            <a:fld id="{C4AA1B3F-5DB5-4716-98C6-6D5158A1131F}" type="slidenum">
+              <a:rPr lang="en-US" smtClean="0"/>
+              <a:t>3</a:t>
+            </a:fld>
+            <a:endParaRPr lang="en-US"/>
+          </a:p>
+        </p:txBody>
+      </p:sp>
     </p:spTree>
     <p:extLst>
       <p:ext uri="{BB962C8B-B14F-4D97-AF65-F5344CB8AC3E}">
@@ -4792,6 +6486,35 @@
           </a:prstGeom>
         </p:spPr>
       </p:pic>
+      <p:sp>
+        <p:nvSpPr>
+          <p:cNvPr id="2" name="Slide Number Placeholder 1">
+            <a:extLst>
+              <a:ext uri="{FF2B5EF4-FFF2-40B4-BE49-F238E27FC236}">
+                <a16:creationId xmlns:a16="http://schemas.microsoft.com/office/drawing/2014/main" id="{34174357-2EBF-98C5-38C6-B1A65B50C586}"/>
+              </a:ext>
+            </a:extLst>
+          </p:cNvPr>
+          <p:cNvSpPr>
+            <a:spLocks noGrp="1"/>
+          </p:cNvSpPr>
+          <p:nvPr>
+            <p:ph type="sldNum" sz="quarter" idx="12"/>
+          </p:nvPr>
+        </p:nvSpPr>
+        <p:spPr/>
+        <p:txBody>
+          <a:bodyPr/>
+          <a:lstStyle/>
+          <a:p>
+            <a:fld id="{C4AA1B3F-5DB5-4716-98C6-6D5158A1131F}" type="slidenum">
+              <a:rPr lang="en-US" smtClean="0"/>
+              <a:t>4</a:t>
+            </a:fld>
+            <a:endParaRPr lang="en-US"/>
+          </a:p>
+        </p:txBody>
+      </p:sp>
     </p:spTree>
     <p:extLst>
       <p:ext uri="{BB962C8B-B14F-4D97-AF65-F5344CB8AC3E}">
@@ -4806,6 +6529,100 @@
 </file>
 
 <file path=ppt/slides/slide5.xml><?xml version="1.0" encoding="utf-8"?>
+<p:sld xmlns:a="http://schemas.openxmlformats.org/drawingml/2006/main" xmlns:r="http://schemas.openxmlformats.org/officeDocument/2006/relationships" xmlns:p="http://schemas.openxmlformats.org/presentationml/2006/main">
+  <p:cSld>
+    <p:spTree>
+      <p:nvGrpSpPr>
+        <p:cNvPr id="1" name=""/>
+        <p:cNvGrpSpPr/>
+        <p:nvPr/>
+      </p:nvGrpSpPr>
+      <p:grpSpPr>
+        <a:xfrm>
+          <a:off x="0" y="0"/>
+          <a:ext cx="0" cy="0"/>
+          <a:chOff x="0" y="0"/>
+          <a:chExt cx="0" cy="0"/>
+        </a:xfrm>
+      </p:grpSpPr>
+      <p:sp>
+        <p:nvSpPr>
+          <p:cNvPr id="2" name="Slide Number Placeholder 1">
+            <a:extLst>
+              <a:ext uri="{FF2B5EF4-FFF2-40B4-BE49-F238E27FC236}">
+                <a16:creationId xmlns:a16="http://schemas.microsoft.com/office/drawing/2014/main" id="{E98D0D50-DC16-7EC2-B425-45BF3F6890B0}"/>
+              </a:ext>
+            </a:extLst>
+          </p:cNvPr>
+          <p:cNvSpPr>
+            <a:spLocks noGrp="1"/>
+          </p:cNvSpPr>
+          <p:nvPr>
+            <p:ph type="sldNum" sz="quarter" idx="12"/>
+          </p:nvPr>
+        </p:nvSpPr>
+        <p:spPr/>
+        <p:txBody>
+          <a:bodyPr/>
+          <a:lstStyle/>
+          <a:p>
+            <a:fld id="{C4AA1B3F-5DB5-4716-98C6-6D5158A1131F}" type="slidenum">
+              <a:rPr lang="en-US" smtClean="0"/>
+              <a:t>5</a:t>
+            </a:fld>
+            <a:endParaRPr lang="en-US"/>
+          </a:p>
+        </p:txBody>
+      </p:sp>
+      <p:pic>
+        <p:nvPicPr>
+          <p:cNvPr id="5" name="Picture 4" descr="A close-up of a web page&#10;&#10;Description automatically generated">
+            <a:extLst>
+              <a:ext uri="{FF2B5EF4-FFF2-40B4-BE49-F238E27FC236}">
+                <a16:creationId xmlns:a16="http://schemas.microsoft.com/office/drawing/2014/main" id="{F5FC1F42-E476-45AD-55C2-386120899030}"/>
+              </a:ext>
+            </a:extLst>
+          </p:cNvPr>
+          <p:cNvPicPr>
+            <a:picLocks noChangeAspect="1"/>
+          </p:cNvPicPr>
+          <p:nvPr/>
+        </p:nvPicPr>
+        <p:blipFill rotWithShape="1">
+          <a:blip r:embed="rId2">
+            <a:extLst>
+              <a:ext uri="{28A0092B-C50C-407E-A947-70E740481C1C}">
+                <a14:useLocalDpi xmlns:a14="http://schemas.microsoft.com/office/drawing/2010/main" val="0"/>
+              </a:ext>
+            </a:extLst>
+          </a:blip>
+          <a:srcRect l="39085" t="22506" r="24054" b="66238"/>
+          <a:stretch/>
+        </p:blipFill>
+        <p:spPr>
+          <a:xfrm>
+            <a:off x="1453415" y="1029902"/>
+            <a:ext cx="9288379" cy="2127183"/>
+          </a:xfrm>
+          <a:prstGeom prst="rect">
+            <a:avLst/>
+          </a:prstGeom>
+        </p:spPr>
+      </p:pic>
+    </p:spTree>
+    <p:extLst>
+      <p:ext uri="{BB962C8B-B14F-4D97-AF65-F5344CB8AC3E}">
+        <p14:creationId xmlns:p14="http://schemas.microsoft.com/office/powerpoint/2010/main" val="2827068955"/>
+      </p:ext>
+    </p:extLst>
+  </p:cSld>
+  <p:clrMapOvr>
+    <a:masterClrMapping/>
+  </p:clrMapOvr>
+</p:sld>
+</file>
+
+<file path=ppt/slides/slide6.xml><?xml version="1.0" encoding="utf-8"?>
 <p:sld xmlns:a="http://schemas.openxmlformats.org/drawingml/2006/main" xmlns:r="http://schemas.openxmlformats.org/officeDocument/2006/relationships" xmlns:p="http://schemas.openxmlformats.org/presentationml/2006/main">
   <p:cSld>
     <p:bg>
@@ -5115,6 +6932,35 @@
           <a:lstStyle/>
           <a:p>
             <a:pPr algn="ctr"/>
+            <a:endParaRPr lang="en-US"/>
+          </a:p>
+        </p:txBody>
+      </p:sp>
+      <p:sp>
+        <p:nvSpPr>
+          <p:cNvPr id="2" name="Slide Number Placeholder 1">
+            <a:extLst>
+              <a:ext uri="{FF2B5EF4-FFF2-40B4-BE49-F238E27FC236}">
+                <a16:creationId xmlns:a16="http://schemas.microsoft.com/office/drawing/2014/main" id="{1796D5F4-F9F6-6A5D-3118-34F2F04B5596}"/>
+              </a:ext>
+            </a:extLst>
+          </p:cNvPr>
+          <p:cNvSpPr>
+            <a:spLocks noGrp="1"/>
+          </p:cNvSpPr>
+          <p:nvPr>
+            <p:ph type="sldNum" sz="quarter" idx="12"/>
+          </p:nvPr>
+        </p:nvSpPr>
+        <p:spPr/>
+        <p:txBody>
+          <a:bodyPr/>
+          <a:lstStyle/>
+          <a:p>
+            <a:fld id="{C4AA1B3F-5DB5-4716-98C6-6D5158A1131F}" type="slidenum">
+              <a:rPr lang="en-US" smtClean="0"/>
+              <a:t>6</a:t>
+            </a:fld>
             <a:endParaRPr lang="en-US"/>
           </a:p>
         </p:txBody>
@@ -5210,7 +7056,7 @@
 </p:sld>
 </file>
 
-<file path=ppt/slides/slide6.xml><?xml version="1.0" encoding="utf-8"?>
+<file path=ppt/slides/slide7.xml><?xml version="1.0" encoding="utf-8"?>
 <p:sld xmlns:a="http://schemas.openxmlformats.org/drawingml/2006/main" xmlns:r="http://schemas.openxmlformats.org/officeDocument/2006/relationships" xmlns:p="http://schemas.openxmlformats.org/presentationml/2006/main">
   <p:cSld>
     <p:spTree>
@@ -5545,6 +7391,35 @@
           </a:prstGeom>
         </p:spPr>
       </p:pic>
+      <p:sp>
+        <p:nvSpPr>
+          <p:cNvPr id="3" name="Slide Number Placeholder 2">
+            <a:extLst>
+              <a:ext uri="{FF2B5EF4-FFF2-40B4-BE49-F238E27FC236}">
+                <a16:creationId xmlns:a16="http://schemas.microsoft.com/office/drawing/2014/main" id="{7BB68E61-496D-6881-2D54-D0A00814B973}"/>
+              </a:ext>
+            </a:extLst>
+          </p:cNvPr>
+          <p:cNvSpPr>
+            <a:spLocks noGrp="1"/>
+          </p:cNvSpPr>
+          <p:nvPr>
+            <p:ph type="sldNum" sz="quarter" idx="12"/>
+          </p:nvPr>
+        </p:nvSpPr>
+        <p:spPr/>
+        <p:txBody>
+          <a:bodyPr/>
+          <a:lstStyle/>
+          <a:p>
+            <a:fld id="{C4AA1B3F-5DB5-4716-98C6-6D5158A1131F}" type="slidenum">
+              <a:rPr lang="en-US" smtClean="0"/>
+              <a:t>7</a:t>
+            </a:fld>
+            <a:endParaRPr lang="en-US"/>
+          </a:p>
+        </p:txBody>
+      </p:sp>
     </p:spTree>
     <p:extLst>
       <p:ext uri="{BB962C8B-B14F-4D97-AF65-F5344CB8AC3E}">
@@ -5961,7 +7836,7 @@
 </p:sld>
 </file>
 
-<file path=ppt/slides/slide7.xml><?xml version="1.0" encoding="utf-8"?>
+<file path=ppt/slides/slide8.xml><?xml version="1.0" encoding="utf-8"?>
 <p:sld xmlns:a="http://schemas.openxmlformats.org/drawingml/2006/main" xmlns:r="http://schemas.openxmlformats.org/officeDocument/2006/relationships" xmlns:p="http://schemas.openxmlformats.org/presentationml/2006/main">
   <p:cSld>
     <p:spTree>
@@ -6101,6 +7976,35 @@
           </a:prstGeom>
         </p:spPr>
       </p:pic>
+      <p:sp>
+        <p:nvSpPr>
+          <p:cNvPr id="3" name="Slide Number Placeholder 2">
+            <a:extLst>
+              <a:ext uri="{FF2B5EF4-FFF2-40B4-BE49-F238E27FC236}">
+                <a16:creationId xmlns:a16="http://schemas.microsoft.com/office/drawing/2014/main" id="{BD6C8312-A234-9F7B-E1A1-C46F9B9F35E4}"/>
+              </a:ext>
+            </a:extLst>
+          </p:cNvPr>
+          <p:cNvSpPr>
+            <a:spLocks noGrp="1"/>
+          </p:cNvSpPr>
+          <p:nvPr>
+            <p:ph type="sldNum" sz="quarter" idx="12"/>
+          </p:nvPr>
+        </p:nvSpPr>
+        <p:spPr/>
+        <p:txBody>
+          <a:bodyPr/>
+          <a:lstStyle/>
+          <a:p>
+            <a:fld id="{C4AA1B3F-5DB5-4716-98C6-6D5158A1131F}" type="slidenum">
+              <a:rPr lang="en-US" smtClean="0"/>
+              <a:t>8</a:t>
+            </a:fld>
+            <a:endParaRPr lang="en-US"/>
+          </a:p>
+        </p:txBody>
+      </p:sp>
     </p:spTree>
     <p:extLst>
       <p:ext uri="{BB962C8B-B14F-4D97-AF65-F5344CB8AC3E}">
@@ -6279,7 +8183,7 @@
 </p:sld>
 </file>
 
-<file path=ppt/slides/slide8.xml><?xml version="1.0" encoding="utf-8"?>
+<file path=ppt/slides/slide9.xml><?xml version="1.0" encoding="utf-8"?>
 <p:sld xmlns:a="http://schemas.openxmlformats.org/drawingml/2006/main" xmlns:r="http://schemas.openxmlformats.org/officeDocument/2006/relationships" xmlns:p="http://schemas.openxmlformats.org/presentationml/2006/main">
   <p:cSld>
     <p:spTree>
@@ -6354,6 +8258,35 @@
           </a:prstGeom>
         </p:spPr>
       </p:pic>
+      <p:sp>
+        <p:nvSpPr>
+          <p:cNvPr id="3" name="Slide Number Placeholder 2">
+            <a:extLst>
+              <a:ext uri="{FF2B5EF4-FFF2-40B4-BE49-F238E27FC236}">
+                <a16:creationId xmlns:a16="http://schemas.microsoft.com/office/drawing/2014/main" id="{A7CD4652-D88F-9590-066B-8EEB40F05560}"/>
+              </a:ext>
+            </a:extLst>
+          </p:cNvPr>
+          <p:cNvSpPr>
+            <a:spLocks noGrp="1"/>
+          </p:cNvSpPr>
+          <p:nvPr>
+            <p:ph type="sldNum" sz="quarter" idx="12"/>
+          </p:nvPr>
+        </p:nvSpPr>
+        <p:spPr/>
+        <p:txBody>
+          <a:bodyPr/>
+          <a:lstStyle/>
+          <a:p>
+            <a:fld id="{C4AA1B3F-5DB5-4716-98C6-6D5158A1131F}" type="slidenum">
+              <a:rPr lang="en-US" smtClean="0"/>
+              <a:t>9</a:t>
+            </a:fld>
+            <a:endParaRPr lang="en-US"/>
+          </a:p>
+        </p:txBody>
+      </p:sp>
     </p:spTree>
     <p:extLst>
       <p:ext uri="{BB962C8B-B14F-4D97-AF65-F5344CB8AC3E}">
@@ -6364,1036 +8297,6 @@
   <p:clrMapOvr>
     <a:masterClrMapping/>
   </p:clrMapOvr>
-</p:sld>
-</file>
-
-<file path=ppt/slides/slide9.xml><?xml version="1.0" encoding="utf-8"?>
-<p:sld xmlns:a="http://schemas.openxmlformats.org/drawingml/2006/main" xmlns:r="http://schemas.openxmlformats.org/officeDocument/2006/relationships" xmlns:p="http://schemas.openxmlformats.org/presentationml/2006/main">
-  <p:cSld>
-    <p:spTree>
-      <p:nvGrpSpPr>
-        <p:cNvPr id="1" name=""/>
-        <p:cNvGrpSpPr/>
-        <p:nvPr/>
-      </p:nvGrpSpPr>
-      <p:grpSpPr>
-        <a:xfrm>
-          <a:off x="0" y="0"/>
-          <a:ext cx="0" cy="0"/>
-          <a:chOff x="0" y="0"/>
-          <a:chExt cx="0" cy="0"/>
-        </a:xfrm>
-      </p:grpSpPr>
-      <p:sp>
-        <p:nvSpPr>
-          <p:cNvPr id="2" name="Title 1">
-            <a:extLst>
-              <a:ext uri="{FF2B5EF4-FFF2-40B4-BE49-F238E27FC236}">
-                <a16:creationId xmlns:a16="http://schemas.microsoft.com/office/drawing/2014/main" id="{E47DEBAB-28F6-7F07-B08C-552343ED6F09}"/>
-              </a:ext>
-            </a:extLst>
-          </p:cNvPr>
-          <p:cNvSpPr>
-            <a:spLocks noGrp="1"/>
-          </p:cNvSpPr>
-          <p:nvPr>
-            <p:ph type="title"/>
-          </p:nvPr>
-        </p:nvSpPr>
-        <p:spPr>
-          <a:xfrm>
-            <a:off x="838200" y="0"/>
-            <a:ext cx="10515600" cy="1325563"/>
-          </a:xfrm>
-        </p:spPr>
-        <p:txBody>
-          <a:bodyPr/>
-          <a:lstStyle/>
-          <a:p>
-            <a:r>
-              <a:rPr lang="en-US" dirty="0"/>
-              <a:t>Modifications for Improvement</a:t>
-            </a:r>
-          </a:p>
-        </p:txBody>
-      </p:sp>
-      <p:sp>
-        <p:nvSpPr>
-          <p:cNvPr id="3" name="Rectangle: Rounded Corners 2">
-            <a:extLst>
-              <a:ext uri="{FF2B5EF4-FFF2-40B4-BE49-F238E27FC236}">
-                <a16:creationId xmlns:a16="http://schemas.microsoft.com/office/drawing/2014/main" id="{2A80AB20-D356-2EA4-6986-1B7DB9171114}"/>
-              </a:ext>
-            </a:extLst>
-          </p:cNvPr>
-          <p:cNvSpPr/>
-          <p:nvPr/>
-        </p:nvSpPr>
-        <p:spPr>
-          <a:xfrm>
-            <a:off x="773251" y="945085"/>
-            <a:ext cx="3228016" cy="5615274"/>
-          </a:xfrm>
-          <a:prstGeom prst="roundRect">
-            <a:avLst/>
-          </a:prstGeom>
-          <a:noFill/>
-        </p:spPr>
-        <p:style>
-          <a:lnRef idx="2">
-            <a:schemeClr val="accent6">
-              <a:shade val="15000"/>
-            </a:schemeClr>
-          </a:lnRef>
-          <a:fillRef idx="1">
-            <a:schemeClr val="accent6"/>
-          </a:fillRef>
-          <a:effectRef idx="0">
-            <a:schemeClr val="accent6"/>
-          </a:effectRef>
-          <a:fontRef idx="minor">
-            <a:schemeClr val="lt1"/>
-          </a:fontRef>
-        </p:style>
-        <p:txBody>
-          <a:bodyPr rtlCol="0" anchor="ctr"/>
-          <a:lstStyle/>
-          <a:p>
-            <a:r>
-              <a:rPr lang="en-US" sz="1400" b="1" u="sng" dirty="0">
-                <a:solidFill>
-                  <a:schemeClr val="tx1"/>
-                </a:solidFill>
-              </a:rPr>
-              <a:t>Modification1: </a:t>
-            </a:r>
-          </a:p>
-          <a:p>
-            <a:r>
-              <a:rPr lang="en-US" sz="1400" b="1" dirty="0">
-                <a:solidFill>
-                  <a:schemeClr val="tx1"/>
-                </a:solidFill>
-              </a:rPr>
-              <a:t>Labeled loss: </a:t>
-            </a:r>
-            <a:r>
-              <a:rPr lang="en-US" sz="1400" dirty="0">
-                <a:solidFill>
-                  <a:schemeClr val="tx1"/>
-                </a:solidFill>
-              </a:rPr>
-              <a:t>added label smoothing parameter</a:t>
-            </a:r>
-          </a:p>
-          <a:p>
-            <a:endParaRPr lang="en-US" sz="1400" dirty="0">
-              <a:solidFill>
-                <a:schemeClr val="tx1"/>
-              </a:solidFill>
-            </a:endParaRPr>
-          </a:p>
-          <a:p>
-            <a:r>
-              <a:rPr lang="en-US" sz="1400" b="1" dirty="0">
-                <a:solidFill>
-                  <a:schemeClr val="tx1"/>
-                </a:solidFill>
-              </a:rPr>
-              <a:t>Consistency Loss: </a:t>
-            </a:r>
-            <a:r>
-              <a:rPr lang="en-US" sz="1200" b="1" dirty="0">
-                <a:solidFill>
-                  <a:schemeClr val="tx1"/>
-                </a:solidFill>
-              </a:rPr>
-              <a:t>Enhanced Mask usage: </a:t>
-            </a:r>
-            <a:r>
-              <a:rPr lang="en-US" sz="1200" dirty="0">
-                <a:solidFill>
-                  <a:schemeClr val="tx1"/>
-                </a:solidFill>
-              </a:rPr>
-              <a:t>used SoftMax weights</a:t>
-            </a:r>
-            <a:endParaRPr lang="en-US" sz="1400" dirty="0">
-              <a:solidFill>
-                <a:schemeClr val="tx1"/>
-              </a:solidFill>
-            </a:endParaRPr>
-          </a:p>
-          <a:p>
-            <a:r>
-              <a:rPr lang="en-US" sz="1200" b="1" dirty="0">
-                <a:solidFill>
-                  <a:schemeClr val="tx1"/>
-                </a:solidFill>
-              </a:rPr>
-              <a:t>Consistency Loss: </a:t>
-            </a:r>
-            <a:r>
-              <a:rPr lang="en-US" sz="1200" dirty="0">
-                <a:solidFill>
-                  <a:schemeClr val="tx1"/>
-                </a:solidFill>
-              </a:rPr>
-              <a:t>make the logits smoother (worst idea ever!!!) (</a:t>
-            </a:r>
-            <a:r>
-              <a:rPr lang="en-US" sz="1200" dirty="0">
-                <a:solidFill>
-                  <a:srgbClr val="FF0000"/>
-                </a:solidFill>
-              </a:rPr>
-              <a:t>I was not sure what I was thinking</a:t>
-            </a:r>
-            <a:r>
-              <a:rPr lang="en-US" sz="1200" dirty="0">
-                <a:solidFill>
-                  <a:schemeClr val="tx1"/>
-                </a:solidFill>
-              </a:rPr>
-              <a:t>)</a:t>
-            </a:r>
-            <a:endParaRPr lang="en-US" sz="1400" dirty="0">
-              <a:solidFill>
-                <a:schemeClr val="tx1"/>
-              </a:solidFill>
-            </a:endParaRPr>
-          </a:p>
-          <a:p>
-            <a:r>
-              <a:rPr lang="en-US" sz="1200" b="1" dirty="0">
-                <a:solidFill>
-                  <a:schemeClr val="tx1"/>
-                </a:solidFill>
-              </a:rPr>
-              <a:t>L2 regularization: </a:t>
-            </a:r>
-            <a:r>
-              <a:rPr lang="en-US" sz="1200" dirty="0">
-                <a:solidFill>
-                  <a:schemeClr val="tx1"/>
-                </a:solidFill>
-              </a:rPr>
-              <a:t>Not bad! Prevents overfitting </a:t>
-            </a:r>
-          </a:p>
-          <a:p>
-            <a:endParaRPr lang="en-US" sz="1200" dirty="0">
-              <a:solidFill>
-                <a:schemeClr val="tx1"/>
-              </a:solidFill>
-            </a:endParaRPr>
-          </a:p>
-          <a:p>
-            <a:r>
-              <a:rPr lang="en-US" sz="1400" b="1" dirty="0">
-                <a:solidFill>
-                  <a:schemeClr val="tx1"/>
-                </a:solidFill>
-              </a:rPr>
-              <a:t>SAF loss:</a:t>
-            </a:r>
-          </a:p>
-          <a:p>
-            <a:r>
-              <a:rPr lang="en-US" sz="1200" b="1" dirty="0">
-                <a:solidFill>
-                  <a:schemeClr val="tx1"/>
-                </a:solidFill>
-              </a:rPr>
-              <a:t>Self Entropy: </a:t>
-            </a:r>
-            <a:r>
-              <a:rPr lang="en-US" sz="1200" dirty="0">
-                <a:solidFill>
-                  <a:schemeClr val="tx1"/>
-                </a:solidFill>
-              </a:rPr>
-              <a:t>calculate entropy of predicted probabilities for diversity</a:t>
-            </a:r>
-          </a:p>
-          <a:p>
-            <a:r>
-              <a:rPr lang="en-US" sz="1200" b="1" dirty="0">
-                <a:solidFill>
-                  <a:schemeClr val="tx1"/>
-                </a:solidFill>
-              </a:rPr>
-              <a:t>KL divergence: </a:t>
-            </a:r>
-            <a:r>
-              <a:rPr lang="en-US" sz="1200" dirty="0">
-                <a:solidFill>
-                  <a:schemeClr val="tx1"/>
-                </a:solidFill>
-              </a:rPr>
-              <a:t>for additional </a:t>
-            </a:r>
-            <a:r>
-              <a:rPr lang="en-US" sz="1200" dirty="0" err="1">
-                <a:solidFill>
-                  <a:schemeClr val="tx1"/>
-                </a:solidFill>
-              </a:rPr>
-              <a:t>regualization</a:t>
-            </a:r>
-            <a:r>
-              <a:rPr lang="en-US" sz="1200" dirty="0">
-                <a:solidFill>
-                  <a:schemeClr val="tx1"/>
-                </a:solidFill>
-              </a:rPr>
-              <a:t>.</a:t>
-            </a:r>
-          </a:p>
-          <a:p>
-            <a:endParaRPr lang="en-US" sz="1200" dirty="0">
-              <a:solidFill>
-                <a:schemeClr val="tx1"/>
-              </a:solidFill>
-            </a:endParaRPr>
-          </a:p>
-          <a:p>
-            <a:r>
-              <a:rPr lang="en-US" sz="1400" b="1" dirty="0">
-                <a:solidFill>
-                  <a:schemeClr val="tx1"/>
-                </a:solidFill>
-              </a:rPr>
-              <a:t>SAT loss:</a:t>
-            </a:r>
-          </a:p>
-          <a:p>
-            <a:r>
-              <a:rPr lang="en-US" sz="1200" b="1" dirty="0">
-                <a:solidFill>
-                  <a:schemeClr val="tx1"/>
-                </a:solidFill>
-              </a:rPr>
-              <a:t>Temperature to logits: </a:t>
-            </a:r>
-            <a:r>
-              <a:rPr lang="en-US" sz="1200" dirty="0">
-                <a:solidFill>
-                  <a:schemeClr val="tx1"/>
-                </a:solidFill>
-              </a:rPr>
-              <a:t>added temperature for regularization.</a:t>
-            </a:r>
-          </a:p>
-          <a:p>
-            <a:endParaRPr lang="en-US" sz="1200" b="1" dirty="0">
-              <a:solidFill>
-                <a:schemeClr val="tx1"/>
-              </a:solidFill>
-            </a:endParaRPr>
-          </a:p>
-          <a:p>
-            <a:r>
-              <a:rPr lang="en-US" sz="1200" b="1" dirty="0">
-                <a:solidFill>
-                  <a:schemeClr val="tx1"/>
-                </a:solidFill>
-              </a:rPr>
-              <a:t>Diversity Loss:</a:t>
-            </a:r>
-          </a:p>
-          <a:p>
-            <a:r>
-              <a:rPr lang="en-US" sz="1200" dirty="0">
-                <a:solidFill>
-                  <a:schemeClr val="tx1"/>
-                </a:solidFill>
-              </a:rPr>
-              <a:t>mean(sum(</a:t>
-            </a:r>
-            <a:r>
-              <a:rPr lang="en-US" sz="1200" dirty="0" err="1">
-                <a:solidFill>
-                  <a:schemeClr val="tx1"/>
-                </a:solidFill>
-              </a:rPr>
-              <a:t>softmax</a:t>
-            </a:r>
-            <a:r>
-              <a:rPr lang="en-US" sz="1200" dirty="0">
-                <a:solidFill>
-                  <a:schemeClr val="tx1"/>
-                </a:solidFill>
-              </a:rPr>
-              <a:t>(logits)*</a:t>
-            </a:r>
-            <a:r>
-              <a:rPr lang="en-US" sz="1200" dirty="0" err="1">
-                <a:solidFill>
-                  <a:schemeClr val="tx1"/>
-                </a:solidFill>
-              </a:rPr>
-              <a:t>logsoftmax</a:t>
-            </a:r>
-            <a:r>
-              <a:rPr lang="en-US" sz="1200" dirty="0">
-                <a:solidFill>
-                  <a:schemeClr val="tx1"/>
-                </a:solidFill>
-              </a:rPr>
-              <a:t>(logits))</a:t>
-            </a:r>
-            <a:endParaRPr lang="en-US" sz="1200" b="1" dirty="0">
-              <a:solidFill>
-                <a:schemeClr val="tx1"/>
-              </a:solidFill>
-            </a:endParaRPr>
-          </a:p>
-          <a:p>
-            <a:endParaRPr lang="en-US" sz="1200" b="1" dirty="0">
-              <a:solidFill>
-                <a:srgbClr val="FF0000"/>
-              </a:solidFill>
-            </a:endParaRPr>
-          </a:p>
-          <a:p>
-            <a:r>
-              <a:rPr lang="en-US" sz="1200" b="1" dirty="0">
-                <a:solidFill>
-                  <a:srgbClr val="FF0000"/>
-                </a:solidFill>
-              </a:rPr>
-              <a:t>Worst Idea ever!!! Completely performed bad from original</a:t>
-            </a:r>
-          </a:p>
-          <a:p>
-            <a:r>
-              <a:rPr lang="en-US" sz="1400" dirty="0">
-                <a:solidFill>
-                  <a:schemeClr val="tx1"/>
-                </a:solidFill>
-              </a:rPr>
-              <a:t> </a:t>
-            </a:r>
-          </a:p>
-        </p:txBody>
-      </p:sp>
-      <p:sp>
-        <p:nvSpPr>
-          <p:cNvPr id="4" name="Rectangle: Rounded Corners 3">
-            <a:extLst>
-              <a:ext uri="{FF2B5EF4-FFF2-40B4-BE49-F238E27FC236}">
-                <a16:creationId xmlns:a16="http://schemas.microsoft.com/office/drawing/2014/main" id="{39C19363-CC04-7270-DF3A-79E20065A321}"/>
-              </a:ext>
-            </a:extLst>
-          </p:cNvPr>
-          <p:cNvSpPr/>
-          <p:nvPr/>
-        </p:nvSpPr>
-        <p:spPr>
-          <a:xfrm>
-            <a:off x="4325501" y="945085"/>
-            <a:ext cx="3228016" cy="5615274"/>
-          </a:xfrm>
-          <a:prstGeom prst="roundRect">
-            <a:avLst/>
-          </a:prstGeom>
-          <a:noFill/>
-        </p:spPr>
-        <p:style>
-          <a:lnRef idx="2">
-            <a:schemeClr val="accent6">
-              <a:shade val="15000"/>
-            </a:schemeClr>
-          </a:lnRef>
-          <a:fillRef idx="1">
-            <a:schemeClr val="accent6"/>
-          </a:fillRef>
-          <a:effectRef idx="0">
-            <a:schemeClr val="accent6"/>
-          </a:effectRef>
-          <a:fontRef idx="minor">
-            <a:schemeClr val="lt1"/>
-          </a:fontRef>
-        </p:style>
-        <p:txBody>
-          <a:bodyPr rtlCol="0" anchor="ctr"/>
-          <a:lstStyle/>
-          <a:p>
-            <a:r>
-              <a:rPr lang="en-US" sz="1600" b="1" u="sng" dirty="0">
-                <a:solidFill>
-                  <a:schemeClr val="tx1"/>
-                </a:solidFill>
-              </a:rPr>
-              <a:t>Modification 2: </a:t>
-            </a:r>
-          </a:p>
-          <a:p>
-            <a:r>
-              <a:rPr lang="en-US" sz="1600" b="1" dirty="0">
-                <a:solidFill>
-                  <a:schemeClr val="tx1"/>
-                </a:solidFill>
-              </a:rPr>
-              <a:t>Labeled loss: </a:t>
-            </a:r>
-            <a:r>
-              <a:rPr lang="en-US" sz="1600" dirty="0">
-                <a:solidFill>
-                  <a:schemeClr val="tx1"/>
-                </a:solidFill>
-              </a:rPr>
-              <a:t>as original removed label smoothing</a:t>
-            </a:r>
-          </a:p>
-          <a:p>
-            <a:endParaRPr lang="en-US" sz="1600" dirty="0">
-              <a:solidFill>
-                <a:schemeClr val="tx1"/>
-              </a:solidFill>
-            </a:endParaRPr>
-          </a:p>
-          <a:p>
-            <a:r>
-              <a:rPr lang="en-US" sz="1600" b="1" dirty="0">
-                <a:solidFill>
-                  <a:schemeClr val="tx1"/>
-                </a:solidFill>
-              </a:rPr>
-              <a:t>Consistency Loss: </a:t>
-            </a:r>
-          </a:p>
-          <a:p>
-            <a:r>
-              <a:rPr lang="en-US" sz="1400" b="1" dirty="0">
-                <a:solidFill>
-                  <a:schemeClr val="tx1"/>
-                </a:solidFill>
-              </a:rPr>
-              <a:t>L2 regularization: </a:t>
-            </a:r>
-            <a:r>
-              <a:rPr lang="en-US" sz="1400" dirty="0">
-                <a:solidFill>
-                  <a:schemeClr val="tx1"/>
-                </a:solidFill>
-              </a:rPr>
-              <a:t>Not bad! Prevents overfitting </a:t>
-            </a:r>
-          </a:p>
-          <a:p>
-            <a:endParaRPr lang="en-US" sz="1400" dirty="0">
-              <a:solidFill>
-                <a:schemeClr val="tx1"/>
-              </a:solidFill>
-            </a:endParaRPr>
-          </a:p>
-          <a:p>
-            <a:r>
-              <a:rPr lang="en-US" sz="1600" b="1" dirty="0">
-                <a:solidFill>
-                  <a:schemeClr val="tx1"/>
-                </a:solidFill>
-              </a:rPr>
-              <a:t>SAF loss:</a:t>
-            </a:r>
-          </a:p>
-          <a:p>
-            <a:r>
-              <a:rPr lang="en-US" sz="1400" b="1" dirty="0">
-                <a:solidFill>
-                  <a:schemeClr val="tx1"/>
-                </a:solidFill>
-              </a:rPr>
-              <a:t>Self Entropy: </a:t>
-            </a:r>
-            <a:r>
-              <a:rPr lang="en-US" sz="1400" dirty="0">
-                <a:solidFill>
-                  <a:schemeClr val="tx1"/>
-                </a:solidFill>
-              </a:rPr>
-              <a:t>calculate entropy of predicted probabilities for diversity</a:t>
-            </a:r>
-          </a:p>
-          <a:p>
-            <a:r>
-              <a:rPr lang="en-US" sz="1400" b="1" dirty="0">
-                <a:solidFill>
-                  <a:schemeClr val="tx1"/>
-                </a:solidFill>
-              </a:rPr>
-              <a:t>KL divergence: </a:t>
-            </a:r>
-            <a:r>
-              <a:rPr lang="en-US" sz="1400" dirty="0">
-                <a:solidFill>
-                  <a:schemeClr val="tx1"/>
-                </a:solidFill>
-              </a:rPr>
-              <a:t>for additional </a:t>
-            </a:r>
-            <a:r>
-              <a:rPr lang="en-US" sz="1400" dirty="0" err="1">
-                <a:solidFill>
-                  <a:schemeClr val="tx1"/>
-                </a:solidFill>
-              </a:rPr>
-              <a:t>regualization</a:t>
-            </a:r>
-            <a:r>
-              <a:rPr lang="en-US" sz="1400" dirty="0">
-                <a:solidFill>
-                  <a:schemeClr val="tx1"/>
-                </a:solidFill>
-              </a:rPr>
-              <a:t>.</a:t>
-            </a:r>
-          </a:p>
-          <a:p>
-            <a:endParaRPr lang="en-US" sz="1400" dirty="0">
-              <a:solidFill>
-                <a:schemeClr val="tx1"/>
-              </a:solidFill>
-            </a:endParaRPr>
-          </a:p>
-          <a:p>
-            <a:r>
-              <a:rPr lang="en-US" sz="1600" b="1" dirty="0">
-                <a:solidFill>
-                  <a:schemeClr val="tx1"/>
-                </a:solidFill>
-              </a:rPr>
-              <a:t>SAT loss:</a:t>
-            </a:r>
-          </a:p>
-          <a:p>
-            <a:endParaRPr lang="en-US" sz="1400" b="1" dirty="0">
-              <a:solidFill>
-                <a:schemeClr val="tx1"/>
-              </a:solidFill>
-            </a:endParaRPr>
-          </a:p>
-          <a:p>
-            <a:r>
-              <a:rPr lang="en-US" sz="1400" b="1" dirty="0">
-                <a:solidFill>
-                  <a:schemeClr val="tx1"/>
-                </a:solidFill>
-              </a:rPr>
-              <a:t>Diversity Loss:</a:t>
-            </a:r>
-          </a:p>
-          <a:p>
-            <a:r>
-              <a:rPr lang="en-US" sz="1400" dirty="0">
-                <a:solidFill>
-                  <a:schemeClr val="tx1"/>
-                </a:solidFill>
-              </a:rPr>
-              <a:t>mean(sum(</a:t>
-            </a:r>
-            <a:r>
-              <a:rPr lang="en-US" sz="1400" dirty="0" err="1">
-                <a:solidFill>
-                  <a:schemeClr val="tx1"/>
-                </a:solidFill>
-              </a:rPr>
-              <a:t>softmax</a:t>
-            </a:r>
-            <a:r>
-              <a:rPr lang="en-US" sz="1400" dirty="0">
-                <a:solidFill>
-                  <a:schemeClr val="tx1"/>
-                </a:solidFill>
-              </a:rPr>
-              <a:t>(logits)*</a:t>
-            </a:r>
-            <a:r>
-              <a:rPr lang="en-US" sz="1400" dirty="0" err="1">
-                <a:solidFill>
-                  <a:schemeClr val="tx1"/>
-                </a:solidFill>
-              </a:rPr>
-              <a:t>logsoftmax</a:t>
-            </a:r>
-            <a:r>
-              <a:rPr lang="en-US" sz="1400" dirty="0">
-                <a:solidFill>
-                  <a:schemeClr val="tx1"/>
-                </a:solidFill>
-              </a:rPr>
-              <a:t>(logits))</a:t>
-            </a:r>
-            <a:endParaRPr lang="en-US" sz="1400" b="1" dirty="0">
-              <a:solidFill>
-                <a:schemeClr val="tx1"/>
-              </a:solidFill>
-            </a:endParaRPr>
-          </a:p>
-          <a:p>
-            <a:endParaRPr lang="en-US" sz="1400" b="1" dirty="0">
-              <a:solidFill>
-                <a:srgbClr val="FF0000"/>
-              </a:solidFill>
-            </a:endParaRPr>
-          </a:p>
-          <a:p>
-            <a:r>
-              <a:rPr lang="en-US" sz="1400" b="1" dirty="0">
-                <a:solidFill>
-                  <a:srgbClr val="FF0000"/>
-                </a:solidFill>
-              </a:rPr>
-              <a:t>Performed better but still didn’t surpass original technique.</a:t>
-            </a:r>
-          </a:p>
-        </p:txBody>
-      </p:sp>
-      <p:sp>
-        <p:nvSpPr>
-          <p:cNvPr id="5" name="Rectangle: Rounded Corners 4">
-            <a:extLst>
-              <a:ext uri="{FF2B5EF4-FFF2-40B4-BE49-F238E27FC236}">
-                <a16:creationId xmlns:a16="http://schemas.microsoft.com/office/drawing/2014/main" id="{239076BC-4248-9E76-AB98-543DD05145C8}"/>
-              </a:ext>
-            </a:extLst>
-          </p:cNvPr>
-          <p:cNvSpPr/>
-          <p:nvPr/>
-        </p:nvSpPr>
-        <p:spPr>
-          <a:xfrm>
-            <a:off x="7877751" y="945085"/>
-            <a:ext cx="3228016" cy="5615274"/>
-          </a:xfrm>
-          <a:prstGeom prst="roundRect">
-            <a:avLst/>
-          </a:prstGeom>
-          <a:noFill/>
-        </p:spPr>
-        <p:style>
-          <a:lnRef idx="2">
-            <a:schemeClr val="accent6">
-              <a:shade val="15000"/>
-            </a:schemeClr>
-          </a:lnRef>
-          <a:fillRef idx="1">
-            <a:schemeClr val="accent6"/>
-          </a:fillRef>
-          <a:effectRef idx="0">
-            <a:schemeClr val="accent6"/>
-          </a:effectRef>
-          <a:fontRef idx="minor">
-            <a:schemeClr val="lt1"/>
-          </a:fontRef>
-        </p:style>
-        <p:txBody>
-          <a:bodyPr rtlCol="0" anchor="ctr"/>
-          <a:lstStyle/>
-          <a:p>
-            <a:r>
-              <a:rPr lang="en-US" sz="1600" b="1" u="sng" dirty="0">
-                <a:solidFill>
-                  <a:schemeClr val="tx1"/>
-                </a:solidFill>
-              </a:rPr>
-              <a:t>Modification 3: </a:t>
-            </a:r>
-          </a:p>
-          <a:p>
-            <a:r>
-              <a:rPr lang="en-US" sz="1600" b="1" dirty="0">
-                <a:solidFill>
-                  <a:schemeClr val="tx1"/>
-                </a:solidFill>
-              </a:rPr>
-              <a:t>Labeled loss:</a:t>
-            </a:r>
-            <a:r>
-              <a:rPr lang="en-US" sz="1600" dirty="0">
-                <a:solidFill>
-                  <a:schemeClr val="tx1"/>
-                </a:solidFill>
-              </a:rPr>
-              <a:t> as original</a:t>
-            </a:r>
-          </a:p>
-          <a:p>
-            <a:r>
-              <a:rPr lang="en-US" sz="1600" b="1" dirty="0">
-                <a:solidFill>
-                  <a:schemeClr val="tx1"/>
-                </a:solidFill>
-              </a:rPr>
-              <a:t>Consistency Loss: </a:t>
-            </a:r>
-          </a:p>
-          <a:p>
-            <a:r>
-              <a:rPr lang="en-US" sz="1400" dirty="0">
-                <a:solidFill>
-                  <a:schemeClr val="tx1"/>
-                </a:solidFill>
-              </a:rPr>
-              <a:t>As original</a:t>
-            </a:r>
-          </a:p>
-          <a:p>
-            <a:r>
-              <a:rPr lang="en-US" sz="1600" b="1" dirty="0">
-                <a:solidFill>
-                  <a:schemeClr val="tx1"/>
-                </a:solidFill>
-              </a:rPr>
-              <a:t>SAF loss:</a:t>
-            </a:r>
-          </a:p>
-          <a:p>
-            <a:r>
-              <a:rPr lang="en-US" sz="1400" dirty="0">
-                <a:solidFill>
-                  <a:schemeClr val="tx1"/>
-                </a:solidFill>
-              </a:rPr>
-              <a:t>As original</a:t>
-            </a:r>
-          </a:p>
-          <a:p>
-            <a:r>
-              <a:rPr lang="en-US" sz="1600" b="1" dirty="0">
-                <a:solidFill>
-                  <a:schemeClr val="tx1"/>
-                </a:solidFill>
-              </a:rPr>
-              <a:t>SAT loss:</a:t>
-            </a:r>
-          </a:p>
-          <a:p>
-            <a:r>
-              <a:rPr lang="en-US" sz="1400" b="1" dirty="0">
-                <a:solidFill>
-                  <a:schemeClr val="tx1"/>
-                </a:solidFill>
-              </a:rPr>
-              <a:t>Added an attention layer for samples: </a:t>
-            </a:r>
-            <a:r>
-              <a:rPr lang="en-US" sz="1400" dirty="0">
-                <a:solidFill>
-                  <a:schemeClr val="tx1"/>
-                </a:solidFill>
-              </a:rPr>
-              <a:t>A single attention layer that will look for important samples to focus on and boost their logits, hence altering global temperatures.</a:t>
-            </a:r>
-          </a:p>
-          <a:p>
-            <a:endParaRPr lang="en-US" sz="1400" b="1" dirty="0">
-              <a:solidFill>
-                <a:schemeClr val="tx1"/>
-              </a:solidFill>
-            </a:endParaRPr>
-          </a:p>
-          <a:p>
-            <a:r>
-              <a:rPr lang="en-US" sz="1400" b="1" dirty="0">
-                <a:solidFill>
-                  <a:srgbClr val="FF0000"/>
-                </a:solidFill>
-              </a:rPr>
-              <a:t>Performed better than Mod 1 and Outperformed Mod2 until a point and then saturated. Root cause the Attention layer did not let the global temperature go up causing sub optimal performance.</a:t>
-            </a:r>
-          </a:p>
-          <a:p>
-            <a:endParaRPr lang="en-US" sz="1400" b="1" dirty="0">
-              <a:solidFill>
-                <a:srgbClr val="FF0000"/>
-              </a:solidFill>
-            </a:endParaRPr>
-          </a:p>
-        </p:txBody>
-      </p:sp>
-    </p:spTree>
-    <p:extLst>
-      <p:ext uri="{BB962C8B-B14F-4D97-AF65-F5344CB8AC3E}">
-        <p14:creationId xmlns:p14="http://schemas.microsoft.com/office/powerpoint/2010/main" val="3510635656"/>
-      </p:ext>
-    </p:extLst>
-  </p:cSld>
-  <p:clrMapOvr>
-    <a:masterClrMapping/>
-  </p:clrMapOvr>
-  <p:timing>
-    <p:tnLst>
-      <p:par>
-        <p:cTn id="1" dur="indefinite" restart="never" nodeType="tmRoot">
-          <p:childTnLst>
-            <p:seq concurrent="1" nextAc="seek">
-              <p:cTn id="2" dur="indefinite" nodeType="mainSeq">
-                <p:childTnLst>
-                  <p:par>
-                    <p:cTn id="3" fill="hold">
-                      <p:stCondLst>
-                        <p:cond delay="indefinite"/>
-                      </p:stCondLst>
-                      <p:childTnLst>
-                        <p:par>
-                          <p:cTn id="4" fill="hold">
-                            <p:stCondLst>
-                              <p:cond delay="0"/>
-                            </p:stCondLst>
-                            <p:childTnLst>
-                              <p:par>
-                                <p:cTn id="5" presetID="1" presetClass="entr" presetSubtype="0" fill="hold" grpId="0" nodeType="clickEffect">
-                                  <p:stCondLst>
-                                    <p:cond delay="0"/>
-                                  </p:stCondLst>
-                                  <p:childTnLst>
-                                    <p:set>
-                                      <p:cBhvr>
-                                        <p:cTn id="6" dur="1" fill="hold">
-                                          <p:stCondLst>
-                                            <p:cond delay="0"/>
-                                          </p:stCondLst>
-                                        </p:cTn>
-                                        <p:tgtEl>
-                                          <p:spTgt spid="3"/>
-                                        </p:tgtEl>
-                                        <p:attrNameLst>
-                                          <p:attrName>style.visibility</p:attrName>
-                                        </p:attrNameLst>
-                                      </p:cBhvr>
-                                      <p:to>
-                                        <p:strVal val="visible"/>
-                                      </p:to>
-                                    </p:set>
-                                  </p:childTnLst>
-                                </p:cTn>
-                              </p:par>
-                            </p:childTnLst>
-                          </p:cTn>
-                        </p:par>
-                      </p:childTnLst>
-                    </p:cTn>
-                  </p:par>
-                  <p:par>
-                    <p:cTn id="7" fill="hold">
-                      <p:stCondLst>
-                        <p:cond delay="indefinite"/>
-                      </p:stCondLst>
-                      <p:childTnLst>
-                        <p:par>
-                          <p:cTn id="8" fill="hold">
-                            <p:stCondLst>
-                              <p:cond delay="0"/>
-                            </p:stCondLst>
-                            <p:childTnLst>
-                              <p:par>
-                                <p:cTn id="9" presetID="1" presetClass="entr" presetSubtype="0" fill="hold" grpId="0" nodeType="clickEffect">
-                                  <p:stCondLst>
-                                    <p:cond delay="0"/>
-                                  </p:stCondLst>
-                                  <p:childTnLst>
-                                    <p:set>
-                                      <p:cBhvr>
-                                        <p:cTn id="10" dur="1" fill="hold">
-                                          <p:stCondLst>
-                                            <p:cond delay="0"/>
-                                          </p:stCondLst>
-                                        </p:cTn>
-                                        <p:tgtEl>
-                                          <p:spTgt spid="4"/>
-                                        </p:tgtEl>
-                                        <p:attrNameLst>
-                                          <p:attrName>style.visibility</p:attrName>
-                                        </p:attrNameLst>
-                                      </p:cBhvr>
-                                      <p:to>
-                                        <p:strVal val="visible"/>
-                                      </p:to>
-                                    </p:set>
-                                  </p:childTnLst>
-                                </p:cTn>
-                              </p:par>
-                            </p:childTnLst>
-                          </p:cTn>
-                        </p:par>
-                      </p:childTnLst>
-                    </p:cTn>
-                  </p:par>
-                  <p:par>
-                    <p:cTn id="11" fill="hold">
-                      <p:stCondLst>
-                        <p:cond delay="indefinite"/>
-                      </p:stCondLst>
-                      <p:childTnLst>
-                        <p:par>
-                          <p:cTn id="12" fill="hold">
-                            <p:stCondLst>
-                              <p:cond delay="0"/>
-                            </p:stCondLst>
-                            <p:childTnLst>
-                              <p:par>
-                                <p:cTn id="13" presetID="1" presetClass="entr" presetSubtype="0" fill="hold" grpId="0" nodeType="clickEffect">
-                                  <p:stCondLst>
-                                    <p:cond delay="0"/>
-                                  </p:stCondLst>
-                                  <p:childTnLst>
-                                    <p:set>
-                                      <p:cBhvr>
-                                        <p:cTn id="14" dur="1" fill="hold">
-                                          <p:stCondLst>
-                                            <p:cond delay="0"/>
-                                          </p:stCondLst>
-                                        </p:cTn>
-                                        <p:tgtEl>
-                                          <p:spTgt spid="5"/>
-                                        </p:tgtEl>
-                                        <p:attrNameLst>
-                                          <p:attrName>style.visibility</p:attrName>
-                                        </p:attrNameLst>
-                                      </p:cBhvr>
-                                      <p:to>
-                                        <p:strVal val="visible"/>
-                                      </p:to>
-                                    </p:set>
-                                  </p:childTnLst>
-                                </p:cTn>
-                              </p:par>
-                            </p:childTnLst>
-                          </p:cTn>
-                        </p:par>
-                      </p:childTnLst>
-                    </p:cTn>
-                  </p:par>
-                </p:childTnLst>
-              </p:cTn>
-              <p:prevCondLst>
-                <p:cond evt="onPrev" delay="0">
-                  <p:tgtEl>
-                    <p:sldTgt/>
-                  </p:tgtEl>
-                </p:cond>
-              </p:prevCondLst>
-              <p:nextCondLst>
-                <p:cond evt="onNext" delay="0">
-                  <p:tgtEl>
-                    <p:sldTgt/>
-                  </p:tgtEl>
-                </p:cond>
-              </p:nextCondLst>
-            </p:seq>
-          </p:childTnLst>
-        </p:cTn>
-      </p:par>
-    </p:tnLst>
-    <p:bldLst>
-      <p:bldP spid="3" grpId="0" animBg="1"/>
-      <p:bldP spid="4" grpId="0" animBg="1"/>
-      <p:bldP spid="5" grpId="0" animBg="1"/>
-    </p:bldLst>
-  </p:timing>
 </p:sld>
 </file>
 

</xml_diff>